<commit_message>
Add decision making slide
</commit_message>
<xml_diff>
--- a/GitHub Japan Marketing Strategy.pptx
+++ b/GitHub Japan Marketing Strategy.pptx
@@ -5,7 +5,7 @@
     <p:sldMasterId id="2147483717" r:id="rId1"/>
   </p:sldMasterIdLst>
   <p:notesMasterIdLst>
-    <p:notesMasterId r:id="rId14"/>
+    <p:notesMasterId r:id="rId16"/>
   </p:notesMasterIdLst>
   <p:sldIdLst>
     <p:sldId id="268" r:id="rId2"/>
@@ -13,13 +13,15 @@
     <p:sldId id="272" r:id="rId4"/>
     <p:sldId id="258" r:id="rId5"/>
     <p:sldId id="269" r:id="rId6"/>
-    <p:sldId id="274" r:id="rId7"/>
-    <p:sldId id="273" r:id="rId8"/>
-    <p:sldId id="266" r:id="rId9"/>
-    <p:sldId id="267" r:id="rId10"/>
-    <p:sldId id="263" r:id="rId11"/>
-    <p:sldId id="260" r:id="rId12"/>
-    <p:sldId id="271" r:id="rId13"/>
+    <p:sldId id="273" r:id="rId7"/>
+    <p:sldId id="266" r:id="rId8"/>
+    <p:sldId id="267" r:id="rId9"/>
+    <p:sldId id="263" r:id="rId10"/>
+    <p:sldId id="260" r:id="rId11"/>
+    <p:sldId id="275" r:id="rId12"/>
+    <p:sldId id="276" r:id="rId13"/>
+    <p:sldId id="271" r:id="rId14"/>
+    <p:sldId id="274" r:id="rId15"/>
   </p:sldIdLst>
   <p:sldSz cx="12192000" cy="6858000"/>
   <p:notesSz cx="6858000" cy="9144000"/>
@@ -170,7 +172,6 @@
           </a:p>
         </c:rich>
       </c:tx>
-      <c:layout/>
       <c:overlay val="0"/>
       <c:spPr>
         <a:noFill/>
@@ -340,9 +341,7 @@
               </c:spPr>
             </c:leaderLines>
             <c:extLst>
-              <c:ext xmlns:c15="http://schemas.microsoft.com/office/drawing/2012/chart" uri="{CE6537A1-D6FC-4f65-9D91-7224C49458BB}">
-                <c15:layout/>
-              </c:ext>
+              <c:ext xmlns:c15="http://schemas.microsoft.com/office/drawing/2012/chart" uri="{CE6537A1-D6FC-4f65-9D91-7224C49458BB}"/>
             </c:extLst>
           </c:dLbls>
           <c:cat>
@@ -419,7 +418,6 @@
     </c:plotArea>
     <c:legend>
       <c:legendPos val="b"/>
-      <c:layout/>
       <c:overlay val="0"/>
       <c:spPr>
         <a:noFill/>
@@ -565,7 +563,7 @@
           <a:p>
             <a:fld id="{FFFEC453-E2FF-B741-A9EA-9192FC291631}" type="datetimeFigureOut">
               <a:rPr kumimoji="1" lang="ja-JP" altLang="en-US" smtClean="0"/>
-              <a:t>2017/3/15</a:t>
+              <a:t>2017/3/17</a:t>
             </a:fld>
             <a:endParaRPr kumimoji="1" lang="ja-JP" altLang="en-US"/>
           </a:p>
@@ -1231,7 +1229,7 @@
           <a:bodyPr/>
           <a:lstStyle/>
           <a:p>
-            <a:endParaRPr kumimoji="1" lang="ja-JP" altLang="en-US" dirty="0"/>
+            <a:endParaRPr kumimoji="1" lang="ja-JP" altLang="en-US"/>
           </a:p>
         </p:txBody>
       </p:sp>
@@ -1261,7 +1259,7 @@
     </p:spTree>
     <p:extLst>
       <p:ext uri="{BB962C8B-B14F-4D97-AF65-F5344CB8AC3E}">
-        <p14:creationId xmlns:p14="http://schemas.microsoft.com/office/powerpoint/2010/main" val="697546737"/>
+        <p14:creationId xmlns:p14="http://schemas.microsoft.com/office/powerpoint/2010/main" val="1781875328"/>
       </p:ext>
     </p:extLst>
   </p:cSld>
@@ -1315,7 +1313,28 @@
           <a:bodyPr/>
           <a:lstStyle/>
           <a:p>
-            <a:endParaRPr kumimoji="1" lang="ja-JP" altLang="en-US"/>
+            <a:pPr marL="8335" marR="0" lvl="0" indent="-8335" algn="l" defTabSz="914400" rtl="0" eaLnBrk="1" fontAlgn="auto" latinLnBrk="0" hangingPunct="1">
+              <a:lnSpc>
+                <a:spcPct val="100000"/>
+              </a:lnSpc>
+              <a:spcBef>
+                <a:spcPts val="0"/>
+              </a:spcBef>
+              <a:spcAft>
+                <a:spcPts val="0"/>
+              </a:spcAft>
+              <a:buClrTx/>
+              <a:buSzPct val="25000"/>
+              <a:buFontTx/>
+              <a:buNone/>
+              <a:tabLst/>
+              <a:defRPr/>
+            </a:pPr>
+            <a:endParaRPr lang="en-US" altLang="ja-JP" sz="2000" dirty="0" smtClean="0">
+              <a:latin typeface="Arial" charset="0"/>
+              <a:ea typeface="Arial" charset="0"/>
+              <a:cs typeface="Arial" charset="0"/>
+            </a:endParaRPr>
           </a:p>
         </p:txBody>
       </p:sp>
@@ -1335,17 +1354,26 @@
           <a:lstStyle/>
           <a:p>
             <a:fld id="{4CF00E19-F562-4142-A0E8-E8BCB60B6EB5}" type="slidenum">
-              <a:rPr lang="en-US" smtClean="0"/>
+              <a:rPr lang="en-US" smtClean="0">
+                <a:solidFill>
+                  <a:prstClr val="black"/>
+                </a:solidFill>
+              </a:rPr>
+              <a:pPr/>
               <a:t>7</a:t>
             </a:fld>
-            <a:endParaRPr lang="en-US" dirty="0"/>
+            <a:endParaRPr lang="en-US" dirty="0">
+              <a:solidFill>
+                <a:prstClr val="black"/>
+              </a:solidFill>
+            </a:endParaRPr>
           </a:p>
         </p:txBody>
       </p:sp>
     </p:spTree>
     <p:extLst>
       <p:ext uri="{BB962C8B-B14F-4D97-AF65-F5344CB8AC3E}">
-        <p14:creationId xmlns:p14="http://schemas.microsoft.com/office/powerpoint/2010/main" val="1781875328"/>
+        <p14:creationId xmlns:p14="http://schemas.microsoft.com/office/powerpoint/2010/main" val="965247819"/>
       </p:ext>
     </p:extLst>
   </p:cSld>
@@ -1446,7 +1474,7 @@
                 </a:solidFill>
               </a:rPr>
               <a:pPr/>
-              <a:t>8</a:t>
+              <a:t>10</a:t>
             </a:fld>
             <a:endParaRPr lang="en-US" dirty="0">
               <a:solidFill>
@@ -1459,7 +1487,7 @@
     </p:spTree>
     <p:extLst>
       <p:ext uri="{BB962C8B-B14F-4D97-AF65-F5344CB8AC3E}">
-        <p14:creationId xmlns:p14="http://schemas.microsoft.com/office/powerpoint/2010/main" val="965247819"/>
+        <p14:creationId xmlns:p14="http://schemas.microsoft.com/office/powerpoint/2010/main" val="233007543"/>
       </p:ext>
     </p:extLst>
   </p:cSld>
@@ -1513,28 +1541,7 @@
           <a:bodyPr/>
           <a:lstStyle/>
           <a:p>
-            <a:pPr marL="8335" marR="0" lvl="0" indent="-8335" algn="l" defTabSz="914400" rtl="0" eaLnBrk="1" fontAlgn="auto" latinLnBrk="0" hangingPunct="1">
-              <a:lnSpc>
-                <a:spcPct val="100000"/>
-              </a:lnSpc>
-              <a:spcBef>
-                <a:spcPts val="0"/>
-              </a:spcBef>
-              <a:spcAft>
-                <a:spcPts val="0"/>
-              </a:spcAft>
-              <a:buClrTx/>
-              <a:buSzPct val="25000"/>
-              <a:buFontTx/>
-              <a:buNone/>
-              <a:tabLst/>
-              <a:defRPr/>
-            </a:pPr>
-            <a:endParaRPr lang="en-US" altLang="ja-JP" sz="2000" dirty="0" smtClean="0">
-              <a:latin typeface="Arial" charset="0"/>
-              <a:ea typeface="Arial" charset="0"/>
-              <a:cs typeface="Arial" charset="0"/>
-            </a:endParaRPr>
+            <a:endParaRPr kumimoji="1" lang="ja-JP" altLang="en-US" dirty="0"/>
           </a:p>
         </p:txBody>
       </p:sp>
@@ -1554,26 +1561,17 @@
           <a:lstStyle/>
           <a:p>
             <a:fld id="{4CF00E19-F562-4142-A0E8-E8BCB60B6EB5}" type="slidenum">
-              <a:rPr lang="en-US" smtClean="0">
-                <a:solidFill>
-                  <a:prstClr val="black"/>
-                </a:solidFill>
-              </a:rPr>
-              <a:pPr/>
-              <a:t>11</a:t>
+              <a:rPr lang="en-US" smtClean="0"/>
+              <a:t>14</a:t>
             </a:fld>
-            <a:endParaRPr lang="en-US" dirty="0">
-              <a:solidFill>
-                <a:prstClr val="black"/>
-              </a:solidFill>
-            </a:endParaRPr>
+            <a:endParaRPr lang="en-US" dirty="0"/>
           </a:p>
         </p:txBody>
       </p:sp>
     </p:spTree>
     <p:extLst>
       <p:ext uri="{BB962C8B-B14F-4D97-AF65-F5344CB8AC3E}">
-        <p14:creationId xmlns:p14="http://schemas.microsoft.com/office/powerpoint/2010/main" val="233007543"/>
+        <p14:creationId xmlns:p14="http://schemas.microsoft.com/office/powerpoint/2010/main" val="697546737"/>
       </p:ext>
     </p:extLst>
   </p:cSld>
@@ -3084,7 +3082,7 @@
           <a:p>
             <a:fld id="{0AB07F87-E0B4-8949-A90A-54340C823909}" type="datetimeFigureOut">
               <a:rPr kumimoji="1" lang="ja-JP" altLang="en-US" smtClean="0"/>
-              <a:t>2017/3/15</a:t>
+              <a:t>2017/3/17</a:t>
             </a:fld>
             <a:endParaRPr kumimoji="1" lang="ja-JP" altLang="en-US"/>
           </a:p>
@@ -3555,448 +3553,6 @@
 </file>
 
 <file path=ppt/slides/slide10.xml><?xml version="1.0" encoding="utf-8"?>
-<p:sld xmlns:a="http://schemas.openxmlformats.org/drawingml/2006/main" xmlns:r="http://schemas.openxmlformats.org/officeDocument/2006/relationships" xmlns:p="http://schemas.openxmlformats.org/presentationml/2006/main">
-  <p:cSld>
-    <p:spTree>
-      <p:nvGrpSpPr>
-        <p:cNvPr id="1" name=""/>
-        <p:cNvGrpSpPr/>
-        <p:nvPr/>
-      </p:nvGrpSpPr>
-      <p:grpSpPr>
-        <a:xfrm>
-          <a:off x="0" y="0"/>
-          <a:ext cx="0" cy="0"/>
-          <a:chOff x="0" y="0"/>
-          <a:chExt cx="0" cy="0"/>
-        </a:xfrm>
-      </p:grpSpPr>
-      <p:sp>
-        <p:nvSpPr>
-          <p:cNvPr id="2" name="Title 1"/>
-          <p:cNvSpPr>
-            <a:spLocks noGrp="1"/>
-          </p:cNvSpPr>
-          <p:nvPr>
-            <p:ph type="title"/>
-          </p:nvPr>
-        </p:nvSpPr>
-        <p:spPr>
-          <a:xfrm>
-            <a:off x="322023" y="328628"/>
-            <a:ext cx="11426632" cy="605294"/>
-          </a:xfrm>
-        </p:spPr>
-        <p:txBody>
-          <a:bodyPr/>
-          <a:lstStyle/>
-          <a:p>
-            <a:r>
-              <a:rPr kumimoji="1" lang="en-US" altLang="ja-JP" sz="3600" b="1" dirty="0" smtClean="0">
-                <a:solidFill>
-                  <a:srgbClr val="00B0F0"/>
-                </a:solidFill>
-                <a:latin typeface="Arial" charset="0"/>
-                <a:ea typeface="Arial" charset="0"/>
-                <a:cs typeface="Arial" charset="0"/>
-              </a:rPr>
-              <a:t>Persona</a:t>
-            </a:r>
-            <a:endParaRPr kumimoji="1" lang="ja-JP" altLang="en-US" sz="2933" b="1" dirty="0">
-              <a:solidFill>
-                <a:srgbClr val="00B0F0"/>
-              </a:solidFill>
-              <a:latin typeface="Arial" charset="0"/>
-              <a:ea typeface="Arial" charset="0"/>
-              <a:cs typeface="Arial" charset="0"/>
-            </a:endParaRPr>
-          </a:p>
-        </p:txBody>
-      </p:sp>
-      <p:sp>
-        <p:nvSpPr>
-          <p:cNvPr id="5" name="Text Placeholder 3"/>
-          <p:cNvSpPr>
-            <a:spLocks noGrp="1"/>
-          </p:cNvSpPr>
-          <p:nvPr>
-            <p:ph type="body" sz="quarter" idx="11"/>
-          </p:nvPr>
-        </p:nvSpPr>
-        <p:spPr>
-          <a:xfrm>
-            <a:off x="322023" y="2952711"/>
-            <a:ext cx="5859321" cy="3200876"/>
-          </a:xfrm>
-        </p:spPr>
-        <p:txBody>
-          <a:bodyPr/>
-          <a:lstStyle/>
-          <a:p>
-            <a:pPr marL="0" indent="0">
-              <a:buNone/>
-            </a:pPr>
-            <a:r>
-              <a:rPr lang="en-US" altLang="ja-JP" sz="2000" b="1" dirty="0">
-                <a:solidFill>
-                  <a:schemeClr val="tx1"/>
-                </a:solidFill>
-                <a:latin typeface="Arial" charset="0"/>
-                <a:ea typeface="Arial" charset="0"/>
-                <a:cs typeface="Arial" charset="0"/>
-              </a:rPr>
-              <a:t>in-house Developers in </a:t>
-            </a:r>
-            <a:r>
-              <a:rPr lang="en-US" altLang="ja-JP" sz="2000" b="1" dirty="0" smtClean="0">
-                <a:solidFill>
-                  <a:schemeClr val="tx1"/>
-                </a:solidFill>
-                <a:latin typeface="Arial" charset="0"/>
-                <a:ea typeface="Arial" charset="0"/>
-                <a:cs typeface="Arial" charset="0"/>
-              </a:rPr>
-              <a:t>larger companies:</a:t>
-            </a:r>
-          </a:p>
-          <a:p>
-            <a:pPr marL="0" indent="0">
-              <a:buNone/>
-            </a:pPr>
-            <a:r>
-              <a:rPr lang="en-US" altLang="ja-JP" dirty="0" smtClean="0">
-                <a:solidFill>
-                  <a:schemeClr val="tx1"/>
-                </a:solidFill>
-                <a:latin typeface="Arial" charset="0"/>
-                <a:ea typeface="Arial" charset="0"/>
-                <a:cs typeface="Arial" charset="0"/>
-              </a:rPr>
-              <a:t>Who is </a:t>
-            </a:r>
-            <a:r>
-              <a:rPr lang="en-US" altLang="ja-JP" dirty="0">
-                <a:solidFill>
-                  <a:schemeClr val="tx1"/>
-                </a:solidFill>
-                <a:latin typeface="Arial" charset="0"/>
-                <a:ea typeface="Arial" charset="0"/>
-                <a:cs typeface="Arial" charset="0"/>
-              </a:rPr>
-              <a:t>involved in the innovation, design, coding, testing and maintenance for both front-end and back-end development depending on the needs and resources of a project</a:t>
-            </a:r>
-            <a:r>
-              <a:rPr lang="en-US" altLang="ja-JP" dirty="0" smtClean="0">
-                <a:solidFill>
-                  <a:schemeClr val="tx1"/>
-                </a:solidFill>
-                <a:latin typeface="Arial" charset="0"/>
-                <a:ea typeface="Arial" charset="0"/>
-                <a:cs typeface="Arial" charset="0"/>
-              </a:rPr>
-              <a:t>.</a:t>
-            </a:r>
-          </a:p>
-          <a:p>
-            <a:pPr marL="0" indent="0">
-              <a:buNone/>
-            </a:pPr>
-            <a:r>
-              <a:rPr lang="en-US" altLang="ja-JP" dirty="0" smtClean="0">
-                <a:solidFill>
-                  <a:schemeClr val="tx1"/>
-                </a:solidFill>
-                <a:latin typeface="Arial" charset="0"/>
-                <a:ea typeface="Arial" charset="0"/>
-                <a:cs typeface="Arial" charset="0"/>
-              </a:rPr>
-              <a:t>He </a:t>
-            </a:r>
-            <a:r>
-              <a:rPr lang="en-US" altLang="ja-JP" dirty="0">
-                <a:solidFill>
-                  <a:schemeClr val="tx1"/>
-                </a:solidFill>
-                <a:latin typeface="Arial" charset="0"/>
-                <a:ea typeface="Arial" charset="0"/>
-                <a:cs typeface="Arial" charset="0"/>
-              </a:rPr>
-              <a:t>mainly codes in C# or Java for customer-facing applications. He also uses HTML/CSS, JavaScript, and some PHP for smaller web or mobile projects. Nick also integrates with back-end web-services, APIs, legacy applications, databases and packaged </a:t>
-            </a:r>
-            <a:r>
-              <a:rPr lang="en-US" altLang="ja-JP" dirty="0" smtClean="0">
-                <a:solidFill>
-                  <a:schemeClr val="tx1"/>
-                </a:solidFill>
-                <a:latin typeface="Arial" charset="0"/>
-                <a:ea typeface="Arial" charset="0"/>
-                <a:cs typeface="Arial" charset="0"/>
-              </a:rPr>
-              <a:t>applications.</a:t>
-            </a:r>
-          </a:p>
-          <a:p>
-            <a:pPr marL="0" indent="0">
-              <a:buNone/>
-            </a:pPr>
-            <a:r>
-              <a:rPr lang="en-US" altLang="ja-JP" dirty="0" smtClean="0">
-                <a:solidFill>
-                  <a:schemeClr val="tx1"/>
-                </a:solidFill>
-                <a:latin typeface="Arial" charset="0"/>
-                <a:ea typeface="Arial" charset="0"/>
-                <a:cs typeface="Arial" charset="0"/>
-              </a:rPr>
-              <a:t>He </a:t>
-            </a:r>
-            <a:r>
-              <a:rPr lang="en-US" altLang="ja-JP" dirty="0">
-                <a:solidFill>
-                  <a:schemeClr val="tx1"/>
-                </a:solidFill>
-                <a:latin typeface="Arial" charset="0"/>
-                <a:ea typeface="Arial" charset="0"/>
-                <a:cs typeface="Arial" charset="0"/>
-              </a:rPr>
-              <a:t>wants to get work done quickly and with minimal interruptions. He wants tools that allow more effective collaboration and communication</a:t>
-            </a:r>
-            <a:r>
-              <a:rPr lang="en-US" altLang="ja-JP" dirty="0" smtClean="0">
-                <a:solidFill>
-                  <a:schemeClr val="tx1"/>
-                </a:solidFill>
-                <a:latin typeface="Arial" charset="0"/>
-                <a:ea typeface="Arial" charset="0"/>
-                <a:cs typeface="Arial" charset="0"/>
-              </a:rPr>
-              <a:t>.</a:t>
-            </a:r>
-          </a:p>
-        </p:txBody>
-      </p:sp>
-      <p:sp>
-        <p:nvSpPr>
-          <p:cNvPr id="18" name="Text Placeholder 3"/>
-          <p:cNvSpPr>
-            <a:spLocks noGrp="1"/>
-          </p:cNvSpPr>
-          <p:nvPr>
-            <p:ph type="body" sz="quarter" idx="12"/>
-          </p:nvPr>
-        </p:nvSpPr>
-        <p:spPr>
-          <a:xfrm>
-            <a:off x="6940362" y="2952711"/>
-            <a:ext cx="5093141" cy="3816429"/>
-          </a:xfrm>
-        </p:spPr>
-        <p:txBody>
-          <a:bodyPr/>
-          <a:lstStyle/>
-          <a:p>
-            <a:pPr marL="0" indent="0">
-              <a:lnSpc>
-                <a:spcPct val="100000"/>
-              </a:lnSpc>
-              <a:buNone/>
-            </a:pPr>
-            <a:r>
-              <a:rPr lang="en-US" altLang="ja-JP" sz="1800" b="1" dirty="0">
-                <a:solidFill>
-                  <a:schemeClr val="tx1"/>
-                </a:solidFill>
-                <a:latin typeface="Arial" charset="0"/>
-                <a:ea typeface="Arial" charset="0"/>
-                <a:cs typeface="Arial" charset="0"/>
-              </a:rPr>
-              <a:t>Client Challenges </a:t>
-            </a:r>
-            <a:endParaRPr lang="en-US" altLang="ja-JP" sz="1800" dirty="0">
-              <a:solidFill>
-                <a:schemeClr val="tx1"/>
-              </a:solidFill>
-              <a:latin typeface="Arial" charset="0"/>
-              <a:ea typeface="Arial" charset="0"/>
-              <a:cs typeface="Arial" charset="0"/>
-            </a:endParaRPr>
-          </a:p>
-          <a:p>
-            <a:pPr marL="285750" indent="-285750">
-              <a:lnSpc>
-                <a:spcPct val="100000"/>
-              </a:lnSpc>
-              <a:buFont typeface="Wingdings" charset="2"/>
-              <a:buChar char="p"/>
-            </a:pPr>
-            <a:r>
-              <a:rPr lang="en-US" altLang="ja-JP" sz="1600" dirty="0">
-                <a:solidFill>
-                  <a:schemeClr val="tx1"/>
-                </a:solidFill>
-                <a:latin typeface="Arial" charset="0"/>
-                <a:ea typeface="Arial" charset="0"/>
-                <a:cs typeface="Arial" charset="0"/>
-              </a:rPr>
-              <a:t>Deal with delays and bottlenecks across the software delivery lifecycle, </a:t>
-            </a:r>
-            <a:r>
-              <a:rPr lang="en-US" altLang="ja-JP" sz="1600" dirty="0" smtClean="0">
-                <a:solidFill>
-                  <a:schemeClr val="tx1"/>
-                </a:solidFill>
-                <a:latin typeface="Arial" charset="0"/>
-                <a:ea typeface="Arial" charset="0"/>
-                <a:cs typeface="Arial" charset="0"/>
-              </a:rPr>
-              <a:t>achieve </a:t>
-            </a:r>
-            <a:r>
-              <a:rPr lang="en-US" altLang="ja-JP" sz="1600" dirty="0">
-                <a:solidFill>
-                  <a:schemeClr val="tx1"/>
-                </a:solidFill>
-                <a:latin typeface="Arial" charset="0"/>
-                <a:ea typeface="Arial" charset="0"/>
-                <a:cs typeface="Arial" charset="0"/>
-              </a:rPr>
-              <a:t>faster response times for defect analysis and </a:t>
-            </a:r>
-            <a:r>
-              <a:rPr lang="en-US" altLang="ja-JP" sz="1600" dirty="0" smtClean="0">
-                <a:solidFill>
-                  <a:schemeClr val="tx1"/>
-                </a:solidFill>
-                <a:latin typeface="Arial" charset="0"/>
-                <a:ea typeface="Arial" charset="0"/>
-                <a:cs typeface="Arial" charset="0"/>
-              </a:rPr>
-              <a:t>remediation.</a:t>
-            </a:r>
-            <a:endParaRPr lang="en-US" altLang="ja-JP" sz="1600" dirty="0">
-              <a:solidFill>
-                <a:schemeClr val="tx1"/>
-              </a:solidFill>
-              <a:latin typeface="Arial" charset="0"/>
-              <a:ea typeface="Arial" charset="0"/>
-              <a:cs typeface="Arial" charset="0"/>
-            </a:endParaRPr>
-          </a:p>
-          <a:p>
-            <a:pPr marL="285750" indent="-285750">
-              <a:lnSpc>
-                <a:spcPct val="100000"/>
-              </a:lnSpc>
-              <a:buFont typeface="Wingdings" charset="2"/>
-              <a:buChar char="p"/>
-            </a:pPr>
-            <a:r>
-              <a:rPr lang="en-US" altLang="ja-JP" sz="1600" dirty="0">
-                <a:solidFill>
-                  <a:schemeClr val="tx1"/>
-                </a:solidFill>
-                <a:latin typeface="Arial" charset="0"/>
-                <a:ea typeface="Arial" charset="0"/>
-                <a:cs typeface="Arial" charset="0"/>
-              </a:rPr>
-              <a:t>Communicate effectively with clients and co-workers; working remotely with colleagues.</a:t>
-            </a:r>
-          </a:p>
-          <a:p>
-            <a:pPr marL="285750" indent="-285750">
-              <a:lnSpc>
-                <a:spcPct val="100000"/>
-              </a:lnSpc>
-              <a:buFont typeface="Wingdings" charset="2"/>
-              <a:buChar char="p"/>
-            </a:pPr>
-            <a:r>
-              <a:rPr lang="en-US" altLang="ja-JP" sz="1600" dirty="0">
-                <a:solidFill>
-                  <a:schemeClr val="tx1"/>
-                </a:solidFill>
-                <a:latin typeface="Arial" charset="0"/>
-                <a:ea typeface="Arial" charset="0"/>
-                <a:cs typeface="Arial" charset="0"/>
-              </a:rPr>
-              <a:t>Work with multiple tools across multiple projects.</a:t>
-            </a:r>
-            <a:endParaRPr lang="en-US" altLang="ja-JP" sz="1600" dirty="0" smtClean="0">
-              <a:solidFill>
-                <a:schemeClr val="tx1"/>
-              </a:solidFill>
-              <a:latin typeface="Arial" charset="0"/>
-              <a:ea typeface="Arial" charset="0"/>
-              <a:cs typeface="Arial" charset="0"/>
-            </a:endParaRPr>
-          </a:p>
-          <a:p>
-            <a:pPr marL="285750" indent="-285750">
-              <a:lnSpc>
-                <a:spcPct val="100000"/>
-              </a:lnSpc>
-              <a:buFont typeface="Wingdings" charset="2"/>
-              <a:buChar char="p"/>
-            </a:pPr>
-            <a:r>
-              <a:rPr lang="en-US" altLang="ja-JP" sz="1600" dirty="0">
-                <a:solidFill>
-                  <a:schemeClr val="tx1"/>
-                </a:solidFill>
-                <a:latin typeface="Arial" charset="0"/>
-                <a:ea typeface="Arial" charset="0"/>
-                <a:cs typeface="Arial" charset="0"/>
-              </a:rPr>
-              <a:t>Keep things in-sync across multiple projects.</a:t>
-            </a:r>
-          </a:p>
-        </p:txBody>
-      </p:sp>
-      <p:pic>
-        <p:nvPicPr>
-          <p:cNvPr id="3" name="図 2"/>
-          <p:cNvPicPr>
-            <a:picLocks noChangeAspect="1"/>
-          </p:cNvPicPr>
-          <p:nvPr/>
-        </p:nvPicPr>
-        <p:blipFill>
-          <a:blip r:embed="rId2"/>
-          <a:stretch>
-            <a:fillRect/>
-          </a:stretch>
-        </p:blipFill>
-        <p:spPr>
-          <a:xfrm>
-            <a:off x="322023" y="1152977"/>
-            <a:ext cx="1896813" cy="1580678"/>
-          </a:xfrm>
-          <a:prstGeom prst="rect">
-            <a:avLst/>
-          </a:prstGeom>
-        </p:spPr>
-      </p:pic>
-    </p:spTree>
-    <p:extLst>
-      <p:ext uri="{BB962C8B-B14F-4D97-AF65-F5344CB8AC3E}">
-        <p14:creationId xmlns:p14="http://schemas.microsoft.com/office/powerpoint/2010/main" val="1854431012"/>
-      </p:ext>
-    </p:extLst>
-  </p:cSld>
-  <p:clrMapOvr>
-    <a:masterClrMapping/>
-  </p:clrMapOvr>
-  <p:timing>
-    <p:tnLst>
-      <p:par>
-        <p:cTn id="1" dur="indefinite" restart="never" nodeType="tmRoot"/>
-      </p:par>
-    </p:tnLst>
-  </p:timing>
-</p:sld>
-</file>
-
-<file path=ppt/slides/slide11.xml><?xml version="1.0" encoding="utf-8"?>
 <p:sld xmlns:a="http://schemas.openxmlformats.org/drawingml/2006/main" xmlns:r="http://schemas.openxmlformats.org/officeDocument/2006/relationships" xmlns:p="http://schemas.openxmlformats.org/presentationml/2006/main">
   <p:cSld>
     <p:spTree>
@@ -4689,7 +4245,1577 @@
 </p:sld>
 </file>
 
+<file path=ppt/slides/slide11.xml><?xml version="1.0" encoding="utf-8"?>
+<p:sld xmlns:a="http://schemas.openxmlformats.org/drawingml/2006/main" xmlns:r="http://schemas.openxmlformats.org/officeDocument/2006/relationships" xmlns:p="http://schemas.openxmlformats.org/presentationml/2006/main">
+  <p:cSld>
+    <p:spTree>
+      <p:nvGrpSpPr>
+        <p:cNvPr id="1" name=""/>
+        <p:cNvGrpSpPr/>
+        <p:nvPr/>
+      </p:nvGrpSpPr>
+      <p:grpSpPr>
+        <a:xfrm>
+          <a:off x="0" y="0"/>
+          <a:ext cx="0" cy="0"/>
+          <a:chOff x="0" y="0"/>
+          <a:chExt cx="0" cy="0"/>
+        </a:xfrm>
+      </p:grpSpPr>
+      <p:sp>
+        <p:nvSpPr>
+          <p:cNvPr id="2" name="Title 1"/>
+          <p:cNvSpPr>
+            <a:spLocks noGrp="1"/>
+          </p:cNvSpPr>
+          <p:nvPr>
+            <p:ph type="title"/>
+          </p:nvPr>
+        </p:nvSpPr>
+        <p:spPr>
+          <a:xfrm>
+            <a:off x="373063" y="281839"/>
+            <a:ext cx="11426632" cy="605294"/>
+          </a:xfrm>
+        </p:spPr>
+        <p:txBody>
+          <a:bodyPr/>
+          <a:lstStyle/>
+          <a:p>
+            <a:pPr lvl="1" algn="l" defTabSz="1219170" rtl="0">
+              <a:lnSpc>
+                <a:spcPts val="4000"/>
+              </a:lnSpc>
+              <a:spcBef>
+                <a:spcPct val="0"/>
+              </a:spcBef>
+            </a:pPr>
+            <a:r>
+              <a:rPr kumimoji="1" lang="en-US" altLang="ja-JP" sz="3600" b="1" dirty="0" smtClean="0">
+                <a:solidFill>
+                  <a:srgbClr val="00B0F0"/>
+                </a:solidFill>
+                <a:latin typeface="Arial" charset="0"/>
+                <a:ea typeface="Arial" charset="0"/>
+                <a:cs typeface="Arial" charset="0"/>
+              </a:rPr>
+              <a:t>Decision Making Process in Japan</a:t>
+            </a:r>
+          </a:p>
+        </p:txBody>
+      </p:sp>
+      <p:sp>
+        <p:nvSpPr>
+          <p:cNvPr id="64" name="TextBox 18"/>
+          <p:cNvSpPr txBox="1"/>
+          <p:nvPr/>
+        </p:nvSpPr>
+        <p:spPr>
+          <a:xfrm>
+            <a:off x="373063" y="1309138"/>
+            <a:ext cx="11558588" cy="1369606"/>
+          </a:xfrm>
+          <a:prstGeom prst="rect">
+            <a:avLst/>
+          </a:prstGeom>
+          <a:noFill/>
+          <a:ln>
+            <a:noFill/>
+          </a:ln>
+        </p:spPr>
+        <p:txBody>
+          <a:bodyPr wrap="square" lIns="0" tIns="0" rIns="0" bIns="0" rtlCol="0">
+            <a:spAutoFit/>
+          </a:bodyPr>
+          <a:lstStyle/>
+          <a:p>
+            <a:pPr marL="342891" indent="-342891">
+              <a:spcBef>
+                <a:spcPts val="600"/>
+              </a:spcBef>
+              <a:buFont typeface="Wingdings" panose="05000000000000000000" pitchFamily="2" charset="2"/>
+              <a:buChar char="p"/>
+            </a:pPr>
+            <a:r>
+              <a:rPr lang="en-US" altLang="ja-JP" sz="2100" kern="0" spc="-31" dirty="0">
+                <a:latin typeface="Arial" charset="0"/>
+                <a:ea typeface="Arial" charset="0"/>
+                <a:cs typeface="Arial" charset="0"/>
+              </a:rPr>
+              <a:t>In Japan Market, customers in IT organization of end users often does not have so rich knowledge about infrastructure as those in </a:t>
+            </a:r>
+            <a:r>
+              <a:rPr lang="en-US" altLang="ja-JP" sz="2100" kern="0" spc="-31" dirty="0" smtClean="0">
+                <a:latin typeface="Arial" charset="0"/>
+                <a:ea typeface="Arial" charset="0"/>
+                <a:cs typeface="Arial" charset="0"/>
+              </a:rPr>
+              <a:t>North America</a:t>
+            </a:r>
+            <a:endParaRPr lang="en-US" altLang="ja-JP" sz="2100" kern="0" spc="-31" dirty="0">
+              <a:latin typeface="Arial" charset="0"/>
+              <a:ea typeface="Arial" charset="0"/>
+              <a:cs typeface="Arial" charset="0"/>
+            </a:endParaRPr>
+          </a:p>
+          <a:p>
+            <a:pPr marL="342891" indent="-342891">
+              <a:spcBef>
+                <a:spcPts val="600"/>
+              </a:spcBef>
+              <a:buFont typeface="Wingdings" panose="05000000000000000000" pitchFamily="2" charset="2"/>
+              <a:buChar char="p"/>
+            </a:pPr>
+            <a:r>
+              <a:rPr lang="en-US" altLang="ja-JP" sz="2100" kern="0" spc="-31" dirty="0">
+                <a:latin typeface="Arial" charset="0"/>
+                <a:ea typeface="Arial" charset="0"/>
+                <a:cs typeface="Arial" charset="0"/>
+              </a:rPr>
+              <a:t>Strong IT vendors (including IBM) usually make a long-term contract (more than 5 years) and provided overall IT infrastructure management </a:t>
+            </a:r>
+            <a:r>
+              <a:rPr lang="en-US" altLang="ja-JP" sz="2100" kern="0" spc="-31" dirty="0" smtClean="0">
+                <a:latin typeface="Arial" charset="0"/>
+                <a:ea typeface="Arial" charset="0"/>
+                <a:cs typeface="Arial" charset="0"/>
+              </a:rPr>
+              <a:t>service</a:t>
+            </a:r>
+            <a:endParaRPr lang="ja-JP" altLang="en-US" sz="2100" kern="0" spc="-31" dirty="0" err="1">
+              <a:latin typeface="Arial" charset="0"/>
+              <a:ea typeface="Arial" charset="0"/>
+              <a:cs typeface="Arial" charset="0"/>
+            </a:endParaRPr>
+          </a:p>
+        </p:txBody>
+      </p:sp>
+      <p:grpSp>
+        <p:nvGrpSpPr>
+          <p:cNvPr id="65" name="Group 4"/>
+          <p:cNvGrpSpPr/>
+          <p:nvPr/>
+        </p:nvGrpSpPr>
+        <p:grpSpPr>
+          <a:xfrm>
+            <a:off x="8670930" y="5797992"/>
+            <a:ext cx="500063" cy="714371"/>
+            <a:chOff x="8075613" y="4343400"/>
+            <a:chExt cx="500063" cy="714370"/>
+          </a:xfrm>
+        </p:grpSpPr>
+        <p:sp>
+          <p:nvSpPr>
+            <p:cNvPr id="66" name="Oval 2"/>
+            <p:cNvSpPr/>
+            <p:nvPr/>
+          </p:nvSpPr>
+          <p:spPr>
+            <a:xfrm>
+              <a:off x="8129588" y="4343400"/>
+              <a:ext cx="371475" cy="371475"/>
+            </a:xfrm>
+            <a:prstGeom prst="ellipse">
+              <a:avLst/>
+            </a:prstGeom>
+            <a:solidFill>
+              <a:schemeClr val="tx1"/>
+            </a:solidFill>
+            <a:ln>
+              <a:solidFill>
+                <a:schemeClr val="tx1"/>
+              </a:solidFill>
+            </a:ln>
+            <a:effectLst/>
+          </p:spPr>
+          <p:style>
+            <a:lnRef idx="1">
+              <a:schemeClr val="accent1"/>
+            </a:lnRef>
+            <a:fillRef idx="3">
+              <a:schemeClr val="accent1"/>
+            </a:fillRef>
+            <a:effectRef idx="2">
+              <a:schemeClr val="accent1"/>
+            </a:effectRef>
+            <a:fontRef idx="minor">
+              <a:schemeClr val="lt1"/>
+            </a:fontRef>
+          </p:style>
+          <p:txBody>
+            <a:bodyPr rtlCol="0" anchor="ctr"/>
+            <a:lstStyle/>
+            <a:p>
+              <a:pPr algn="ctr"/>
+              <a:endParaRPr lang="ja-JP" altLang="en-US">
+                <a:solidFill>
+                  <a:prstClr val="white"/>
+                </a:solidFill>
+              </a:endParaRPr>
+            </a:p>
+          </p:txBody>
+        </p:sp>
+        <p:sp>
+          <p:nvSpPr>
+            <p:cNvPr id="67" name="Isosceles Triangle 3"/>
+            <p:cNvSpPr/>
+            <p:nvPr/>
+          </p:nvSpPr>
+          <p:spPr>
+            <a:xfrm>
+              <a:off x="8075613" y="4443408"/>
+              <a:ext cx="500063" cy="614362"/>
+            </a:xfrm>
+            <a:prstGeom prst="triangle">
+              <a:avLst/>
+            </a:prstGeom>
+            <a:solidFill>
+              <a:schemeClr val="tx1"/>
+            </a:solidFill>
+            <a:ln>
+              <a:noFill/>
+            </a:ln>
+            <a:effectLst/>
+          </p:spPr>
+          <p:style>
+            <a:lnRef idx="1">
+              <a:schemeClr val="accent1"/>
+            </a:lnRef>
+            <a:fillRef idx="3">
+              <a:schemeClr val="accent1"/>
+            </a:fillRef>
+            <a:effectRef idx="2">
+              <a:schemeClr val="accent1"/>
+            </a:effectRef>
+            <a:fontRef idx="minor">
+              <a:schemeClr val="lt1"/>
+            </a:fontRef>
+          </p:style>
+          <p:txBody>
+            <a:bodyPr rtlCol="0" anchor="ctr"/>
+            <a:lstStyle/>
+            <a:p>
+              <a:pPr algn="ctr"/>
+              <a:endParaRPr lang="ja-JP" altLang="en-US">
+                <a:solidFill>
+                  <a:prstClr val="white"/>
+                </a:solidFill>
+              </a:endParaRPr>
+            </a:p>
+          </p:txBody>
+        </p:sp>
+      </p:grpSp>
+      <p:grpSp>
+        <p:nvGrpSpPr>
+          <p:cNvPr id="68" name="Group 6"/>
+          <p:cNvGrpSpPr/>
+          <p:nvPr/>
+        </p:nvGrpSpPr>
+        <p:grpSpPr>
+          <a:xfrm>
+            <a:off x="8670931" y="4283515"/>
+            <a:ext cx="500063" cy="714371"/>
+            <a:chOff x="8075613" y="4343400"/>
+            <a:chExt cx="500063" cy="714370"/>
+          </a:xfrm>
+        </p:grpSpPr>
+        <p:sp>
+          <p:nvSpPr>
+            <p:cNvPr id="69" name="Oval 7"/>
+            <p:cNvSpPr/>
+            <p:nvPr/>
+          </p:nvSpPr>
+          <p:spPr>
+            <a:xfrm>
+              <a:off x="8129588" y="4343400"/>
+              <a:ext cx="371475" cy="371475"/>
+            </a:xfrm>
+            <a:prstGeom prst="ellipse">
+              <a:avLst/>
+            </a:prstGeom>
+            <a:solidFill>
+              <a:schemeClr val="tx1"/>
+            </a:solidFill>
+            <a:ln>
+              <a:solidFill>
+                <a:schemeClr val="tx1"/>
+              </a:solidFill>
+            </a:ln>
+            <a:effectLst/>
+          </p:spPr>
+          <p:style>
+            <a:lnRef idx="1">
+              <a:schemeClr val="accent1"/>
+            </a:lnRef>
+            <a:fillRef idx="3">
+              <a:schemeClr val="accent1"/>
+            </a:fillRef>
+            <a:effectRef idx="2">
+              <a:schemeClr val="accent1"/>
+            </a:effectRef>
+            <a:fontRef idx="minor">
+              <a:schemeClr val="lt1"/>
+            </a:fontRef>
+          </p:style>
+          <p:txBody>
+            <a:bodyPr rtlCol="0" anchor="ctr"/>
+            <a:lstStyle/>
+            <a:p>
+              <a:pPr algn="ctr"/>
+              <a:endParaRPr lang="ja-JP" altLang="en-US">
+                <a:solidFill>
+                  <a:prstClr val="white"/>
+                </a:solidFill>
+              </a:endParaRPr>
+            </a:p>
+          </p:txBody>
+        </p:sp>
+        <p:sp>
+          <p:nvSpPr>
+            <p:cNvPr id="70" name="Isosceles Triangle 8"/>
+            <p:cNvSpPr/>
+            <p:nvPr/>
+          </p:nvSpPr>
+          <p:spPr>
+            <a:xfrm>
+              <a:off x="8075613" y="4443408"/>
+              <a:ext cx="500063" cy="614362"/>
+            </a:xfrm>
+            <a:prstGeom prst="triangle">
+              <a:avLst/>
+            </a:prstGeom>
+            <a:solidFill>
+              <a:schemeClr val="tx1"/>
+            </a:solidFill>
+            <a:ln>
+              <a:noFill/>
+            </a:ln>
+            <a:effectLst/>
+          </p:spPr>
+          <p:style>
+            <a:lnRef idx="1">
+              <a:schemeClr val="accent1"/>
+            </a:lnRef>
+            <a:fillRef idx="3">
+              <a:schemeClr val="accent1"/>
+            </a:fillRef>
+            <a:effectRef idx="2">
+              <a:schemeClr val="accent1"/>
+            </a:effectRef>
+            <a:fontRef idx="minor">
+              <a:schemeClr val="lt1"/>
+            </a:fontRef>
+          </p:style>
+          <p:txBody>
+            <a:bodyPr rtlCol="0" anchor="ctr"/>
+            <a:lstStyle/>
+            <a:p>
+              <a:pPr algn="ctr"/>
+              <a:endParaRPr lang="ja-JP" altLang="en-US">
+                <a:solidFill>
+                  <a:prstClr val="white"/>
+                </a:solidFill>
+              </a:endParaRPr>
+            </a:p>
+          </p:txBody>
+        </p:sp>
+      </p:grpSp>
+      <p:grpSp>
+        <p:nvGrpSpPr>
+          <p:cNvPr id="71" name="Group 9"/>
+          <p:cNvGrpSpPr/>
+          <p:nvPr/>
+        </p:nvGrpSpPr>
+        <p:grpSpPr>
+          <a:xfrm>
+            <a:off x="8670930" y="2803917"/>
+            <a:ext cx="500063" cy="714371"/>
+            <a:chOff x="8075613" y="4343400"/>
+            <a:chExt cx="500063" cy="714370"/>
+          </a:xfrm>
+        </p:grpSpPr>
+        <p:sp>
+          <p:nvSpPr>
+            <p:cNvPr id="72" name="Oval 10"/>
+            <p:cNvSpPr/>
+            <p:nvPr/>
+          </p:nvSpPr>
+          <p:spPr>
+            <a:xfrm>
+              <a:off x="8129588" y="4343400"/>
+              <a:ext cx="371475" cy="371475"/>
+            </a:xfrm>
+            <a:prstGeom prst="ellipse">
+              <a:avLst/>
+            </a:prstGeom>
+            <a:solidFill>
+              <a:schemeClr val="tx1"/>
+            </a:solidFill>
+            <a:ln>
+              <a:solidFill>
+                <a:schemeClr val="tx1"/>
+              </a:solidFill>
+            </a:ln>
+            <a:effectLst/>
+          </p:spPr>
+          <p:style>
+            <a:lnRef idx="1">
+              <a:schemeClr val="accent1"/>
+            </a:lnRef>
+            <a:fillRef idx="3">
+              <a:schemeClr val="accent1"/>
+            </a:fillRef>
+            <a:effectRef idx="2">
+              <a:schemeClr val="accent1"/>
+            </a:effectRef>
+            <a:fontRef idx="minor">
+              <a:schemeClr val="lt1"/>
+            </a:fontRef>
+          </p:style>
+          <p:txBody>
+            <a:bodyPr rtlCol="0" anchor="ctr"/>
+            <a:lstStyle/>
+            <a:p>
+              <a:pPr algn="ctr"/>
+              <a:endParaRPr lang="ja-JP" altLang="en-US">
+                <a:solidFill>
+                  <a:prstClr val="white"/>
+                </a:solidFill>
+              </a:endParaRPr>
+            </a:p>
+          </p:txBody>
+        </p:sp>
+        <p:sp>
+          <p:nvSpPr>
+            <p:cNvPr id="73" name="Isosceles Triangle 11"/>
+            <p:cNvSpPr/>
+            <p:nvPr/>
+          </p:nvSpPr>
+          <p:spPr>
+            <a:xfrm>
+              <a:off x="8075613" y="4443408"/>
+              <a:ext cx="500063" cy="614362"/>
+            </a:xfrm>
+            <a:prstGeom prst="triangle">
+              <a:avLst/>
+            </a:prstGeom>
+            <a:solidFill>
+              <a:schemeClr val="tx1"/>
+            </a:solidFill>
+            <a:ln>
+              <a:noFill/>
+            </a:ln>
+            <a:effectLst/>
+          </p:spPr>
+          <p:style>
+            <a:lnRef idx="1">
+              <a:schemeClr val="accent1"/>
+            </a:lnRef>
+            <a:fillRef idx="3">
+              <a:schemeClr val="accent1"/>
+            </a:fillRef>
+            <a:effectRef idx="2">
+              <a:schemeClr val="accent1"/>
+            </a:effectRef>
+            <a:fontRef idx="minor">
+              <a:schemeClr val="lt1"/>
+            </a:fontRef>
+          </p:style>
+          <p:txBody>
+            <a:bodyPr rtlCol="0" anchor="ctr"/>
+            <a:lstStyle/>
+            <a:p>
+              <a:pPr algn="ctr"/>
+              <a:endParaRPr lang="ja-JP" altLang="en-US">
+                <a:solidFill>
+                  <a:prstClr val="white"/>
+                </a:solidFill>
+              </a:endParaRPr>
+            </a:p>
+          </p:txBody>
+        </p:sp>
+      </p:grpSp>
+      <p:pic>
+        <p:nvPicPr>
+          <p:cNvPr id="74" name="Picture 12"/>
+          <p:cNvPicPr>
+            <a:picLocks noChangeAspect="1"/>
+          </p:cNvPicPr>
+          <p:nvPr/>
+        </p:nvPicPr>
+        <p:blipFill>
+          <a:blip r:embed="rId2" cstate="print">
+            <a:extLst>
+              <a:ext uri="{28A0092B-C50C-407E-A947-70E740481C1C}">
+                <a14:useLocalDpi xmlns:a14="http://schemas.microsoft.com/office/drawing/2010/main" val="0"/>
+              </a:ext>
+            </a:extLst>
+          </a:blip>
+          <a:stretch>
+            <a:fillRect/>
+          </a:stretch>
+        </p:blipFill>
+        <p:spPr>
+          <a:xfrm>
+            <a:off x="9884577" y="4102017"/>
+            <a:ext cx="2047075" cy="1151479"/>
+          </a:xfrm>
+          <a:prstGeom prst="rect">
+            <a:avLst/>
+          </a:prstGeom>
+        </p:spPr>
+      </p:pic>
+      <p:sp>
+        <p:nvSpPr>
+          <p:cNvPr id="75" name="TextBox 13"/>
+          <p:cNvSpPr txBox="1"/>
+          <p:nvPr/>
+        </p:nvSpPr>
+        <p:spPr>
+          <a:xfrm>
+            <a:off x="517988" y="3170916"/>
+            <a:ext cx="6684963" cy="2800767"/>
+          </a:xfrm>
+          <a:prstGeom prst="rect">
+            <a:avLst/>
+          </a:prstGeom>
+          <a:noFill/>
+          <a:ln>
+            <a:noFill/>
+          </a:ln>
+        </p:spPr>
+        <p:txBody>
+          <a:bodyPr wrap="square" lIns="0" tIns="0" rIns="0" bIns="0" rtlCol="0">
+            <a:spAutoFit/>
+          </a:bodyPr>
+          <a:lstStyle/>
+          <a:p>
+            <a:pPr marL="342891" indent="-342891">
+              <a:spcBef>
+                <a:spcPts val="900"/>
+              </a:spcBef>
+              <a:buFont typeface="Wingdings" charset="2"/>
+              <a:buChar char="l"/>
+            </a:pPr>
+            <a:r>
+              <a:rPr lang="en-US" altLang="ja-JP" kern="0" spc="-31" dirty="0">
+                <a:latin typeface="Arial" charset="0"/>
+                <a:ea typeface="Arial" charset="0"/>
+                <a:cs typeface="Arial" charset="0"/>
+              </a:rPr>
+              <a:t>IT member and manager in the end customer often do not have a clear authorization to make investment decision.</a:t>
+            </a:r>
+          </a:p>
+          <a:p>
+            <a:pPr marL="342891" indent="-342891">
+              <a:spcBef>
+                <a:spcPts val="900"/>
+              </a:spcBef>
+              <a:buFont typeface="Wingdings" charset="2"/>
+              <a:buChar char="l"/>
+            </a:pPr>
+            <a:r>
+              <a:rPr lang="en-US" altLang="ja-JP" kern="0" spc="-31" dirty="0">
+                <a:latin typeface="Arial" charset="0"/>
+                <a:ea typeface="Arial" charset="0"/>
+                <a:cs typeface="Arial" charset="0"/>
+              </a:rPr>
+              <a:t>“Consensus” in the organization is very important when they decide to invest money for IT Infra.</a:t>
+            </a:r>
+          </a:p>
+          <a:p>
+            <a:pPr marL="342891" indent="-342891">
+              <a:spcBef>
+                <a:spcPts val="900"/>
+              </a:spcBef>
+              <a:buFont typeface="Wingdings" charset="2"/>
+              <a:buChar char="l"/>
+            </a:pPr>
+            <a:r>
+              <a:rPr lang="en-US" altLang="ja-JP" kern="0" spc="-31" dirty="0">
+                <a:latin typeface="Arial" charset="0"/>
+                <a:ea typeface="Arial" charset="0"/>
+                <a:cs typeface="Arial" charset="0"/>
+              </a:rPr>
+              <a:t>Not all IT managers have specific infrastructure knowledge. In case, their main R&amp;R is to manage outsourcing vendor.</a:t>
+            </a:r>
+          </a:p>
+          <a:p>
+            <a:pPr marL="342891" indent="-342891">
+              <a:spcBef>
+                <a:spcPts val="600"/>
+              </a:spcBef>
+              <a:buFont typeface="Wingdings" charset="2"/>
+              <a:buChar char="l"/>
+            </a:pPr>
+            <a:r>
+              <a:rPr lang="en-US" altLang="ja-JP" kern="0" spc="-31" dirty="0">
+                <a:latin typeface="Arial" charset="0"/>
+                <a:ea typeface="Arial" charset="0"/>
+                <a:cs typeface="Arial" charset="0"/>
+              </a:rPr>
+              <a:t>IT vendors have a stronger power in the process of IT infrastructure purchase decision than </a:t>
+            </a:r>
+            <a:r>
+              <a:rPr lang="en-US" altLang="ja-JP" kern="0" spc="-31" dirty="0" smtClean="0">
+                <a:latin typeface="Arial" charset="0"/>
+                <a:ea typeface="Arial" charset="0"/>
+                <a:cs typeface="Arial" charset="0"/>
+              </a:rPr>
+              <a:t>North America, </a:t>
+            </a:r>
+            <a:r>
+              <a:rPr lang="en-US" altLang="ja-JP" kern="0" spc="-31" dirty="0">
+                <a:latin typeface="Arial" charset="0"/>
+                <a:ea typeface="Arial" charset="0"/>
+                <a:cs typeface="Arial" charset="0"/>
+              </a:rPr>
+              <a:t>because specific knowledge are in their organization, not end </a:t>
+            </a:r>
+            <a:r>
+              <a:rPr lang="en-US" altLang="ja-JP" kern="0" spc="-31" dirty="0" smtClean="0">
+                <a:latin typeface="Arial" charset="0"/>
+                <a:ea typeface="Arial" charset="0"/>
+                <a:cs typeface="Arial" charset="0"/>
+              </a:rPr>
+              <a:t>users.</a:t>
+            </a:r>
+            <a:endParaRPr lang="en-US" altLang="ja-JP" kern="0" spc="-31" dirty="0">
+              <a:latin typeface="Arial" charset="0"/>
+              <a:ea typeface="Arial" charset="0"/>
+              <a:cs typeface="Arial" charset="0"/>
+            </a:endParaRPr>
+          </a:p>
+        </p:txBody>
+      </p:sp>
+      <p:cxnSp>
+        <p:nvCxnSpPr>
+          <p:cNvPr id="76" name="Straight Arrow Connector 15"/>
+          <p:cNvCxnSpPr/>
+          <p:nvPr/>
+        </p:nvCxnSpPr>
+        <p:spPr>
+          <a:xfrm flipV="1">
+            <a:off x="8927875" y="3614059"/>
+            <a:ext cx="0" cy="516984"/>
+          </a:xfrm>
+          <a:prstGeom prst="straightConnector1">
+            <a:avLst/>
+          </a:prstGeom>
+          <a:ln>
+            <a:solidFill>
+              <a:schemeClr val="tx1"/>
+            </a:solidFill>
+            <a:tailEnd type="triangle"/>
+          </a:ln>
+        </p:spPr>
+        <p:style>
+          <a:lnRef idx="2">
+            <a:schemeClr val="accent1"/>
+          </a:lnRef>
+          <a:fillRef idx="0">
+            <a:schemeClr val="accent1"/>
+          </a:fillRef>
+          <a:effectRef idx="1">
+            <a:schemeClr val="accent1"/>
+          </a:effectRef>
+          <a:fontRef idx="minor">
+            <a:schemeClr val="tx1"/>
+          </a:fontRef>
+        </p:style>
+      </p:cxnSp>
+      <p:cxnSp>
+        <p:nvCxnSpPr>
+          <p:cNvPr id="77" name="Straight Arrow Connector 17"/>
+          <p:cNvCxnSpPr/>
+          <p:nvPr/>
+        </p:nvCxnSpPr>
+        <p:spPr>
+          <a:xfrm flipV="1">
+            <a:off x="8927875" y="5108349"/>
+            <a:ext cx="0" cy="516984"/>
+          </a:xfrm>
+          <a:prstGeom prst="straightConnector1">
+            <a:avLst/>
+          </a:prstGeom>
+          <a:ln>
+            <a:solidFill>
+              <a:schemeClr val="tx1"/>
+            </a:solidFill>
+            <a:tailEnd type="triangle"/>
+          </a:ln>
+        </p:spPr>
+        <p:style>
+          <a:lnRef idx="2">
+            <a:schemeClr val="accent1"/>
+          </a:lnRef>
+          <a:fillRef idx="0">
+            <a:schemeClr val="accent1"/>
+          </a:fillRef>
+          <a:effectRef idx="1">
+            <a:schemeClr val="accent1"/>
+          </a:effectRef>
+          <a:fontRef idx="minor">
+            <a:schemeClr val="tx1"/>
+          </a:fontRef>
+        </p:style>
+      </p:cxnSp>
+      <p:sp>
+        <p:nvSpPr>
+          <p:cNvPr id="78" name="TextBox 16"/>
+          <p:cNvSpPr txBox="1"/>
+          <p:nvPr/>
+        </p:nvSpPr>
+        <p:spPr>
+          <a:xfrm>
+            <a:off x="7365920" y="3255625"/>
+            <a:ext cx="1726520" cy="276999"/>
+          </a:xfrm>
+          <a:prstGeom prst="rect">
+            <a:avLst/>
+          </a:prstGeom>
+          <a:noFill/>
+          <a:ln>
+            <a:noFill/>
+          </a:ln>
+        </p:spPr>
+        <p:txBody>
+          <a:bodyPr wrap="square" lIns="0" tIns="0" rIns="0" bIns="0" rtlCol="0">
+            <a:spAutoFit/>
+          </a:bodyPr>
+          <a:lstStyle/>
+          <a:p>
+            <a:r>
+              <a:rPr lang="en-US" altLang="ja-JP" b="1" kern="0" spc="-31" dirty="0">
+                <a:solidFill>
+                  <a:schemeClr val="tx2"/>
+                </a:solidFill>
+                <a:latin typeface="Arial" charset="0"/>
+                <a:ea typeface="Arial" charset="0"/>
+                <a:cs typeface="Arial" charset="0"/>
+              </a:rPr>
+              <a:t>CIO</a:t>
+            </a:r>
+            <a:endParaRPr lang="ja-JP" altLang="en-US" b="1" kern="0" spc="-31" dirty="0" err="1">
+              <a:solidFill>
+                <a:schemeClr val="tx2"/>
+              </a:solidFill>
+              <a:latin typeface="Arial" charset="0"/>
+              <a:ea typeface="Arial" charset="0"/>
+              <a:cs typeface="Arial" charset="0"/>
+            </a:endParaRPr>
+          </a:p>
+        </p:txBody>
+      </p:sp>
+      <p:sp>
+        <p:nvSpPr>
+          <p:cNvPr id="79" name="TextBox 19"/>
+          <p:cNvSpPr txBox="1"/>
+          <p:nvPr/>
+        </p:nvSpPr>
+        <p:spPr>
+          <a:xfrm>
+            <a:off x="7365920" y="4316523"/>
+            <a:ext cx="1338997" cy="738664"/>
+          </a:xfrm>
+          <a:prstGeom prst="rect">
+            <a:avLst/>
+          </a:prstGeom>
+          <a:noFill/>
+          <a:ln>
+            <a:noFill/>
+          </a:ln>
+        </p:spPr>
+        <p:txBody>
+          <a:bodyPr wrap="square" lIns="0" tIns="0" rIns="0" bIns="0" rtlCol="0">
+            <a:spAutoFit/>
+          </a:bodyPr>
+          <a:lstStyle/>
+          <a:p>
+            <a:r>
+              <a:rPr lang="en-US" altLang="ja-JP" sz="1200" b="1" kern="0" spc="-31" dirty="0">
+                <a:solidFill>
+                  <a:schemeClr val="tx2"/>
+                </a:solidFill>
+                <a:latin typeface="Arial" charset="0"/>
+                <a:ea typeface="Arial" charset="0"/>
+                <a:cs typeface="Arial" charset="0"/>
+              </a:rPr>
+              <a:t>-IT Architect Manager</a:t>
+            </a:r>
+          </a:p>
+          <a:p>
+            <a:r>
+              <a:rPr lang="en-US" altLang="ja-JP" sz="1200" b="1" kern="0" spc="-31" dirty="0">
+                <a:solidFill>
+                  <a:schemeClr val="tx2"/>
+                </a:solidFill>
+                <a:latin typeface="Arial" charset="0"/>
+                <a:ea typeface="Arial" charset="0"/>
+                <a:cs typeface="Arial" charset="0"/>
+              </a:rPr>
+              <a:t>-IT Application Manager</a:t>
+            </a:r>
+          </a:p>
+        </p:txBody>
+      </p:sp>
+      <p:sp>
+        <p:nvSpPr>
+          <p:cNvPr id="80" name="TextBox 20"/>
+          <p:cNvSpPr txBox="1"/>
+          <p:nvPr/>
+        </p:nvSpPr>
+        <p:spPr>
+          <a:xfrm>
+            <a:off x="7365920" y="6261683"/>
+            <a:ext cx="1726520" cy="276999"/>
+          </a:xfrm>
+          <a:prstGeom prst="rect">
+            <a:avLst/>
+          </a:prstGeom>
+          <a:noFill/>
+          <a:ln>
+            <a:noFill/>
+          </a:ln>
+        </p:spPr>
+        <p:txBody>
+          <a:bodyPr wrap="square" lIns="0" tIns="0" rIns="0" bIns="0" rtlCol="0">
+            <a:spAutoFit/>
+          </a:bodyPr>
+          <a:lstStyle/>
+          <a:p>
+            <a:r>
+              <a:rPr lang="en-US" altLang="ja-JP" b="1" kern="0" spc="-31" dirty="0">
+                <a:solidFill>
+                  <a:schemeClr val="tx2"/>
+                </a:solidFill>
+                <a:latin typeface="Arial" charset="0"/>
+                <a:ea typeface="Arial" charset="0"/>
+                <a:cs typeface="Arial" charset="0"/>
+              </a:rPr>
+              <a:t>IT member</a:t>
+            </a:r>
+            <a:endParaRPr lang="ja-JP" altLang="en-US" b="1" kern="0" spc="-31" dirty="0" err="1">
+              <a:solidFill>
+                <a:schemeClr val="tx2"/>
+              </a:solidFill>
+              <a:latin typeface="Arial" charset="0"/>
+              <a:ea typeface="Arial" charset="0"/>
+              <a:cs typeface="Arial" charset="0"/>
+            </a:endParaRPr>
+          </a:p>
+        </p:txBody>
+      </p:sp>
+      <p:sp>
+        <p:nvSpPr>
+          <p:cNvPr id="81" name="TextBox 21"/>
+          <p:cNvSpPr txBox="1"/>
+          <p:nvPr/>
+        </p:nvSpPr>
+        <p:spPr>
+          <a:xfrm>
+            <a:off x="9358432" y="6354016"/>
+            <a:ext cx="2046515" cy="184666"/>
+          </a:xfrm>
+          <a:prstGeom prst="rect">
+            <a:avLst/>
+          </a:prstGeom>
+          <a:noFill/>
+          <a:ln>
+            <a:noFill/>
+          </a:ln>
+        </p:spPr>
+        <p:txBody>
+          <a:bodyPr wrap="square" lIns="0" tIns="0" rIns="0" bIns="0" rtlCol="0">
+            <a:spAutoFit/>
+          </a:bodyPr>
+          <a:lstStyle/>
+          <a:p>
+            <a:r>
+              <a:rPr lang="en-US" altLang="ja-JP" sz="1200" b="1" kern="0" spc="-31" dirty="0">
+                <a:solidFill>
+                  <a:srgbClr val="83D1F5">
+                    <a:lumMod val="50000"/>
+                  </a:srgbClr>
+                </a:solidFill>
+                <a:latin typeface="Arial" charset="0"/>
+                <a:ea typeface="Arial" charset="0"/>
+                <a:cs typeface="Arial" charset="0"/>
+              </a:rPr>
+              <a:t>No authorization</a:t>
+            </a:r>
+            <a:endParaRPr lang="ja-JP" altLang="en-US" sz="1200" b="1" kern="0" spc="-31" dirty="0" err="1">
+              <a:solidFill>
+                <a:srgbClr val="83D1F5">
+                  <a:lumMod val="50000"/>
+                </a:srgbClr>
+              </a:solidFill>
+              <a:latin typeface="Arial" charset="0"/>
+              <a:ea typeface="Arial" charset="0"/>
+              <a:cs typeface="Arial" charset="0"/>
+            </a:endParaRPr>
+          </a:p>
+        </p:txBody>
+      </p:sp>
+      <p:sp>
+        <p:nvSpPr>
+          <p:cNvPr id="82" name="TextBox 22"/>
+          <p:cNvSpPr txBox="1"/>
+          <p:nvPr/>
+        </p:nvSpPr>
+        <p:spPr>
+          <a:xfrm>
+            <a:off x="7365920" y="5276861"/>
+            <a:ext cx="2046515" cy="369332"/>
+          </a:xfrm>
+          <a:prstGeom prst="rect">
+            <a:avLst/>
+          </a:prstGeom>
+          <a:noFill/>
+          <a:ln>
+            <a:noFill/>
+          </a:ln>
+        </p:spPr>
+        <p:txBody>
+          <a:bodyPr wrap="square" lIns="0" tIns="0" rIns="0" bIns="0" rtlCol="0">
+            <a:spAutoFit/>
+          </a:bodyPr>
+          <a:lstStyle/>
+          <a:p>
+            <a:r>
+              <a:rPr lang="en-US" altLang="ja-JP" sz="1200" b="1" kern="0" spc="-31" dirty="0">
+                <a:solidFill>
+                  <a:srgbClr val="83D1F5">
+                    <a:lumMod val="50000"/>
+                  </a:srgbClr>
+                </a:solidFill>
+                <a:latin typeface="Arial" charset="0"/>
+                <a:ea typeface="Arial" charset="0"/>
+                <a:cs typeface="Arial" charset="0"/>
+              </a:rPr>
+              <a:t>No or small</a:t>
+            </a:r>
+          </a:p>
+          <a:p>
+            <a:r>
+              <a:rPr lang="en-US" altLang="ja-JP" sz="1200" b="1" kern="0" spc="-31" dirty="0">
+                <a:solidFill>
+                  <a:srgbClr val="83D1F5">
+                    <a:lumMod val="50000"/>
+                  </a:srgbClr>
+                </a:solidFill>
+                <a:latin typeface="Arial" charset="0"/>
+                <a:ea typeface="Arial" charset="0"/>
+                <a:cs typeface="Arial" charset="0"/>
+              </a:rPr>
+              <a:t>authorization</a:t>
+            </a:r>
+            <a:endParaRPr lang="ja-JP" altLang="en-US" sz="1200" b="1" kern="0" spc="-31" dirty="0" err="1">
+              <a:solidFill>
+                <a:srgbClr val="83D1F5">
+                  <a:lumMod val="50000"/>
+                </a:srgbClr>
+              </a:solidFill>
+              <a:latin typeface="Arial" charset="0"/>
+              <a:ea typeface="Arial" charset="0"/>
+              <a:cs typeface="Arial" charset="0"/>
+            </a:endParaRPr>
+          </a:p>
+        </p:txBody>
+      </p:sp>
+      <p:sp>
+        <p:nvSpPr>
+          <p:cNvPr id="83" name="TextBox 23"/>
+          <p:cNvSpPr txBox="1"/>
+          <p:nvPr/>
+        </p:nvSpPr>
+        <p:spPr>
+          <a:xfrm>
+            <a:off x="7365921" y="3571089"/>
+            <a:ext cx="1328564" cy="553998"/>
+          </a:xfrm>
+          <a:prstGeom prst="rect">
+            <a:avLst/>
+          </a:prstGeom>
+          <a:noFill/>
+          <a:ln>
+            <a:noFill/>
+          </a:ln>
+        </p:spPr>
+        <p:txBody>
+          <a:bodyPr wrap="square" lIns="0" tIns="0" rIns="0" bIns="0" rtlCol="0">
+            <a:spAutoFit/>
+          </a:bodyPr>
+          <a:lstStyle/>
+          <a:p>
+            <a:r>
+              <a:rPr lang="en-US" altLang="ja-JP" sz="1200" b="1" kern="0" spc="-31" dirty="0">
+                <a:solidFill>
+                  <a:srgbClr val="83D1F5">
+                    <a:lumMod val="50000"/>
+                  </a:srgbClr>
+                </a:solidFill>
+                <a:latin typeface="Arial" charset="0"/>
+                <a:ea typeface="Arial" charset="0"/>
+                <a:cs typeface="Arial" charset="0"/>
+              </a:rPr>
+              <a:t>Decision maker,</a:t>
+            </a:r>
+            <a:br>
+              <a:rPr lang="en-US" altLang="ja-JP" sz="1200" b="1" kern="0" spc="-31" dirty="0">
+                <a:solidFill>
+                  <a:srgbClr val="83D1F5">
+                    <a:lumMod val="50000"/>
+                  </a:srgbClr>
+                </a:solidFill>
+                <a:latin typeface="Arial" charset="0"/>
+                <a:ea typeface="Arial" charset="0"/>
+                <a:cs typeface="Arial" charset="0"/>
+              </a:rPr>
+            </a:br>
+            <a:r>
+              <a:rPr lang="en-US" altLang="ja-JP" sz="1200" b="1" kern="0" spc="-31" dirty="0">
+                <a:solidFill>
+                  <a:srgbClr val="83D1F5">
+                    <a:lumMod val="50000"/>
+                  </a:srgbClr>
+                </a:solidFill>
+                <a:latin typeface="Arial" charset="0"/>
+                <a:ea typeface="Arial" charset="0"/>
+                <a:cs typeface="Arial" charset="0"/>
+              </a:rPr>
+              <a:t>but expect to reach</a:t>
+            </a:r>
+            <a:br>
+              <a:rPr lang="en-US" altLang="ja-JP" sz="1200" b="1" kern="0" spc="-31" dirty="0">
+                <a:solidFill>
+                  <a:srgbClr val="83D1F5">
+                    <a:lumMod val="50000"/>
+                  </a:srgbClr>
+                </a:solidFill>
+                <a:latin typeface="Arial" charset="0"/>
+                <a:ea typeface="Arial" charset="0"/>
+                <a:cs typeface="Arial" charset="0"/>
+              </a:rPr>
+            </a:br>
+            <a:r>
+              <a:rPr lang="en-US" altLang="ja-JP" sz="1200" b="1" kern="0" spc="-31" dirty="0">
+                <a:solidFill>
+                  <a:srgbClr val="83D1F5">
+                    <a:lumMod val="50000"/>
+                  </a:srgbClr>
+                </a:solidFill>
+                <a:latin typeface="Arial" charset="0"/>
+                <a:ea typeface="Arial" charset="0"/>
+                <a:cs typeface="Arial" charset="0"/>
+              </a:rPr>
+              <a:t>consensus</a:t>
+            </a:r>
+            <a:endParaRPr lang="ja-JP" altLang="en-US" sz="1200" b="1" kern="0" spc="-31" dirty="0" err="1">
+              <a:solidFill>
+                <a:srgbClr val="83D1F5">
+                  <a:lumMod val="50000"/>
+                </a:srgbClr>
+              </a:solidFill>
+              <a:latin typeface="Arial" charset="0"/>
+              <a:ea typeface="Arial" charset="0"/>
+              <a:cs typeface="Arial" charset="0"/>
+            </a:endParaRPr>
+          </a:p>
+        </p:txBody>
+      </p:sp>
+      <p:sp>
+        <p:nvSpPr>
+          <p:cNvPr id="84" name="Rectangle 25"/>
+          <p:cNvSpPr/>
+          <p:nvPr/>
+        </p:nvSpPr>
+        <p:spPr>
+          <a:xfrm>
+            <a:off x="10343017" y="5141004"/>
+            <a:ext cx="1291772" cy="359909"/>
+          </a:xfrm>
+          <a:prstGeom prst="rect">
+            <a:avLst/>
+          </a:prstGeom>
+          <a:solidFill>
+            <a:schemeClr val="accent2"/>
+          </a:solidFill>
+          <a:ln w="41275">
+            <a:solidFill>
+              <a:schemeClr val="tx1"/>
+            </a:solidFill>
+          </a:ln>
+          <a:effectLst/>
+        </p:spPr>
+        <p:style>
+          <a:lnRef idx="1">
+            <a:schemeClr val="accent1"/>
+          </a:lnRef>
+          <a:fillRef idx="3">
+            <a:schemeClr val="accent1"/>
+          </a:fillRef>
+          <a:effectRef idx="2">
+            <a:schemeClr val="accent1"/>
+          </a:effectRef>
+          <a:fontRef idx="minor">
+            <a:schemeClr val="lt1"/>
+          </a:fontRef>
+        </p:style>
+        <p:txBody>
+          <a:bodyPr rtlCol="0" anchor="ctr"/>
+          <a:lstStyle/>
+          <a:p>
+            <a:pPr algn="ctr"/>
+            <a:r>
+              <a:rPr lang="en-US" altLang="ja-JP" sz="1400" b="1" dirty="0">
+                <a:solidFill>
+                  <a:schemeClr val="bg1"/>
+                </a:solidFill>
+              </a:rPr>
+              <a:t>IT vendor</a:t>
+            </a:r>
+            <a:endParaRPr lang="ja-JP" altLang="en-US" sz="1400" b="1" dirty="0">
+              <a:solidFill>
+                <a:schemeClr val="bg1"/>
+              </a:solidFill>
+            </a:endParaRPr>
+          </a:p>
+        </p:txBody>
+      </p:sp>
+      <p:cxnSp>
+        <p:nvCxnSpPr>
+          <p:cNvPr id="85" name="Straight Arrow Connector 27"/>
+          <p:cNvCxnSpPr/>
+          <p:nvPr/>
+        </p:nvCxnSpPr>
+        <p:spPr>
+          <a:xfrm>
+            <a:off x="9387462" y="4594588"/>
+            <a:ext cx="672527" cy="0"/>
+          </a:xfrm>
+          <a:prstGeom prst="straightConnector1">
+            <a:avLst/>
+          </a:prstGeom>
+          <a:ln>
+            <a:solidFill>
+              <a:schemeClr val="tx1"/>
+            </a:solidFill>
+            <a:tailEnd type="triangle"/>
+          </a:ln>
+        </p:spPr>
+        <p:style>
+          <a:lnRef idx="2">
+            <a:schemeClr val="accent1"/>
+          </a:lnRef>
+          <a:fillRef idx="0">
+            <a:schemeClr val="accent1"/>
+          </a:fillRef>
+          <a:effectRef idx="1">
+            <a:schemeClr val="accent1"/>
+          </a:effectRef>
+          <a:fontRef idx="minor">
+            <a:schemeClr val="tx1"/>
+          </a:fontRef>
+        </p:style>
+      </p:cxnSp>
+      <p:cxnSp>
+        <p:nvCxnSpPr>
+          <p:cNvPr id="86" name="Straight Arrow Connector 28"/>
+          <p:cNvCxnSpPr/>
+          <p:nvPr/>
+        </p:nvCxnSpPr>
+        <p:spPr>
+          <a:xfrm flipH="1">
+            <a:off x="9374366" y="4803760"/>
+            <a:ext cx="672527" cy="0"/>
+          </a:xfrm>
+          <a:prstGeom prst="straightConnector1">
+            <a:avLst/>
+          </a:prstGeom>
+          <a:ln>
+            <a:solidFill>
+              <a:schemeClr val="tx1"/>
+            </a:solidFill>
+            <a:tailEnd type="triangle"/>
+          </a:ln>
+        </p:spPr>
+        <p:style>
+          <a:lnRef idx="2">
+            <a:schemeClr val="accent1"/>
+          </a:lnRef>
+          <a:fillRef idx="0">
+            <a:schemeClr val="accent1"/>
+          </a:fillRef>
+          <a:effectRef idx="1">
+            <a:schemeClr val="accent1"/>
+          </a:effectRef>
+          <a:fontRef idx="minor">
+            <a:schemeClr val="tx1"/>
+          </a:fontRef>
+        </p:style>
+      </p:cxnSp>
+      <p:sp>
+        <p:nvSpPr>
+          <p:cNvPr id="87" name="TextBox 29"/>
+          <p:cNvSpPr txBox="1"/>
+          <p:nvPr/>
+        </p:nvSpPr>
+        <p:spPr>
+          <a:xfrm>
+            <a:off x="9039199" y="3791126"/>
+            <a:ext cx="1556481" cy="169277"/>
+          </a:xfrm>
+          <a:prstGeom prst="rect">
+            <a:avLst/>
+          </a:prstGeom>
+          <a:noFill/>
+          <a:ln>
+            <a:noFill/>
+          </a:ln>
+        </p:spPr>
+        <p:txBody>
+          <a:bodyPr wrap="square" lIns="0" tIns="0" rIns="0" bIns="0" rtlCol="0">
+            <a:spAutoFit/>
+          </a:bodyPr>
+          <a:lstStyle/>
+          <a:p>
+            <a:r>
+              <a:rPr lang="en-US" altLang="ja-JP" sz="1100" b="1" kern="0" spc="-31" dirty="0">
+                <a:solidFill>
+                  <a:schemeClr val="tx2"/>
+                </a:solidFill>
+                <a:latin typeface="Arial" charset="0"/>
+                <a:ea typeface="Arial" charset="0"/>
+                <a:cs typeface="Arial" charset="0"/>
+              </a:rPr>
+              <a:t>report</a:t>
+            </a:r>
+            <a:endParaRPr lang="ja-JP" altLang="en-US" sz="1100" b="1" kern="0" spc="-31" dirty="0" err="1">
+              <a:solidFill>
+                <a:schemeClr val="tx2"/>
+              </a:solidFill>
+              <a:latin typeface="Arial" charset="0"/>
+              <a:ea typeface="Arial" charset="0"/>
+              <a:cs typeface="Arial" charset="0"/>
+            </a:endParaRPr>
+          </a:p>
+        </p:txBody>
+      </p:sp>
+      <p:sp>
+        <p:nvSpPr>
+          <p:cNvPr id="88" name="TextBox 30"/>
+          <p:cNvSpPr txBox="1"/>
+          <p:nvPr/>
+        </p:nvSpPr>
+        <p:spPr>
+          <a:xfrm>
+            <a:off x="9039200" y="5268863"/>
+            <a:ext cx="1556481" cy="169277"/>
+          </a:xfrm>
+          <a:prstGeom prst="rect">
+            <a:avLst/>
+          </a:prstGeom>
+          <a:noFill/>
+          <a:ln>
+            <a:noFill/>
+          </a:ln>
+        </p:spPr>
+        <p:txBody>
+          <a:bodyPr wrap="square" lIns="0" tIns="0" rIns="0" bIns="0" rtlCol="0">
+            <a:spAutoFit/>
+          </a:bodyPr>
+          <a:lstStyle/>
+          <a:p>
+            <a:r>
+              <a:rPr lang="en-US" altLang="ja-JP" sz="1100" b="1" kern="0" spc="-31" dirty="0">
+                <a:solidFill>
+                  <a:schemeClr val="tx2"/>
+                </a:solidFill>
+                <a:latin typeface="Arial" charset="0"/>
+                <a:ea typeface="Arial" charset="0"/>
+                <a:cs typeface="Arial" charset="0"/>
+              </a:rPr>
+              <a:t>report</a:t>
+            </a:r>
+            <a:endParaRPr lang="ja-JP" altLang="en-US" sz="1100" b="1" kern="0" spc="-31" dirty="0" err="1">
+              <a:solidFill>
+                <a:schemeClr val="tx2"/>
+              </a:solidFill>
+              <a:latin typeface="Arial" charset="0"/>
+              <a:ea typeface="Arial" charset="0"/>
+              <a:cs typeface="Arial" charset="0"/>
+            </a:endParaRPr>
+          </a:p>
+        </p:txBody>
+      </p:sp>
+      <p:sp>
+        <p:nvSpPr>
+          <p:cNvPr id="89" name="TextBox 31"/>
+          <p:cNvSpPr txBox="1"/>
+          <p:nvPr/>
+        </p:nvSpPr>
+        <p:spPr>
+          <a:xfrm>
+            <a:off x="9317704" y="4310690"/>
+            <a:ext cx="1556481" cy="169277"/>
+          </a:xfrm>
+          <a:prstGeom prst="rect">
+            <a:avLst/>
+          </a:prstGeom>
+          <a:noFill/>
+          <a:ln>
+            <a:noFill/>
+          </a:ln>
+        </p:spPr>
+        <p:txBody>
+          <a:bodyPr wrap="square" lIns="0" tIns="0" rIns="0" bIns="0" rtlCol="0">
+            <a:spAutoFit/>
+          </a:bodyPr>
+          <a:lstStyle/>
+          <a:p>
+            <a:r>
+              <a:rPr lang="en-US" altLang="ja-JP" sz="1100" b="1" kern="0" spc="-31" dirty="0">
+                <a:solidFill>
+                  <a:schemeClr val="tx2"/>
+                </a:solidFill>
+                <a:latin typeface="Arial" charset="0"/>
+                <a:ea typeface="Arial" charset="0"/>
+                <a:cs typeface="Arial" charset="0"/>
+              </a:rPr>
+              <a:t>management</a:t>
+            </a:r>
+            <a:endParaRPr lang="ja-JP" altLang="en-US" sz="1100" b="1" kern="0" spc="-31" dirty="0" err="1">
+              <a:solidFill>
+                <a:schemeClr val="tx2"/>
+              </a:solidFill>
+              <a:latin typeface="Arial" charset="0"/>
+              <a:ea typeface="Arial" charset="0"/>
+              <a:cs typeface="Arial" charset="0"/>
+            </a:endParaRPr>
+          </a:p>
+        </p:txBody>
+      </p:sp>
+      <p:sp>
+        <p:nvSpPr>
+          <p:cNvPr id="90" name="TextBox 32"/>
+          <p:cNvSpPr txBox="1"/>
+          <p:nvPr/>
+        </p:nvSpPr>
+        <p:spPr>
+          <a:xfrm>
+            <a:off x="8952209" y="4922082"/>
+            <a:ext cx="1556481" cy="169277"/>
+          </a:xfrm>
+          <a:prstGeom prst="rect">
+            <a:avLst/>
+          </a:prstGeom>
+          <a:noFill/>
+          <a:ln>
+            <a:noFill/>
+          </a:ln>
+        </p:spPr>
+        <p:txBody>
+          <a:bodyPr wrap="square" lIns="0" tIns="0" rIns="0" bIns="0" rtlCol="0">
+            <a:spAutoFit/>
+          </a:bodyPr>
+          <a:lstStyle/>
+          <a:p>
+            <a:pPr algn="ctr"/>
+            <a:r>
+              <a:rPr lang="en-US" altLang="ja-JP" sz="1100" b="1" kern="0" spc="-31" dirty="0">
+                <a:solidFill>
+                  <a:schemeClr val="tx2"/>
+                </a:solidFill>
+                <a:latin typeface="Arial" charset="0"/>
+                <a:ea typeface="Arial" charset="0"/>
+                <a:cs typeface="Arial" charset="0"/>
+              </a:rPr>
+              <a:t>proposal</a:t>
+            </a:r>
+            <a:endParaRPr lang="ja-JP" altLang="en-US" sz="1100" b="1" kern="0" spc="-31" dirty="0" err="1">
+              <a:solidFill>
+                <a:schemeClr val="tx2"/>
+              </a:solidFill>
+              <a:latin typeface="Arial" charset="0"/>
+              <a:ea typeface="Arial" charset="0"/>
+              <a:cs typeface="Arial" charset="0"/>
+            </a:endParaRPr>
+          </a:p>
+        </p:txBody>
+      </p:sp>
+      <p:cxnSp>
+        <p:nvCxnSpPr>
+          <p:cNvPr id="91" name="Elbow Connector 34"/>
+          <p:cNvCxnSpPr/>
+          <p:nvPr/>
+        </p:nvCxnSpPr>
+        <p:spPr>
+          <a:xfrm flipV="1">
+            <a:off x="9223380" y="5627914"/>
+            <a:ext cx="1892523" cy="482817"/>
+          </a:xfrm>
+          <a:prstGeom prst="bentConnector2">
+            <a:avLst/>
+          </a:prstGeom>
+          <a:ln>
+            <a:solidFill>
+              <a:schemeClr val="tx1"/>
+            </a:solidFill>
+            <a:headEnd type="triangle"/>
+            <a:tailEnd type="stealth"/>
+          </a:ln>
+        </p:spPr>
+        <p:style>
+          <a:lnRef idx="2">
+            <a:schemeClr val="accent1"/>
+          </a:lnRef>
+          <a:fillRef idx="0">
+            <a:schemeClr val="accent1"/>
+          </a:fillRef>
+          <a:effectRef idx="1">
+            <a:schemeClr val="accent1"/>
+          </a:effectRef>
+          <a:fontRef idx="minor">
+            <a:schemeClr val="tx1"/>
+          </a:fontRef>
+        </p:style>
+      </p:cxnSp>
+      <p:sp>
+        <p:nvSpPr>
+          <p:cNvPr id="92" name="TextBox 36"/>
+          <p:cNvSpPr txBox="1"/>
+          <p:nvPr/>
+        </p:nvSpPr>
+        <p:spPr>
+          <a:xfrm>
+            <a:off x="9749334" y="5898350"/>
+            <a:ext cx="1556481" cy="169277"/>
+          </a:xfrm>
+          <a:prstGeom prst="rect">
+            <a:avLst/>
+          </a:prstGeom>
+          <a:noFill/>
+          <a:ln>
+            <a:noFill/>
+          </a:ln>
+        </p:spPr>
+        <p:txBody>
+          <a:bodyPr wrap="square" lIns="0" tIns="0" rIns="0" bIns="0" rtlCol="0">
+            <a:spAutoFit/>
+          </a:bodyPr>
+          <a:lstStyle/>
+          <a:p>
+            <a:r>
+              <a:rPr lang="en-US" altLang="ja-JP" sz="1100" b="1" kern="0" spc="-31" dirty="0">
+                <a:solidFill>
+                  <a:schemeClr val="tx2"/>
+                </a:solidFill>
+                <a:latin typeface="Arial" charset="0"/>
+                <a:ea typeface="Arial" charset="0"/>
+                <a:cs typeface="Arial" charset="0"/>
+              </a:rPr>
+              <a:t>Daily Operation</a:t>
+            </a:r>
+            <a:endParaRPr lang="ja-JP" altLang="en-US" sz="1100" b="1" kern="0" spc="-31" dirty="0" err="1">
+              <a:solidFill>
+                <a:schemeClr val="tx2"/>
+              </a:solidFill>
+              <a:latin typeface="Arial" charset="0"/>
+              <a:ea typeface="Arial" charset="0"/>
+              <a:cs typeface="Arial" charset="0"/>
+            </a:endParaRPr>
+          </a:p>
+        </p:txBody>
+      </p:sp>
+    </p:spTree>
+    <p:extLst>
+      <p:ext uri="{BB962C8B-B14F-4D97-AF65-F5344CB8AC3E}">
+        <p14:creationId xmlns:p14="http://schemas.microsoft.com/office/powerpoint/2010/main" val="284871658"/>
+      </p:ext>
+    </p:extLst>
+  </p:cSld>
+  <p:clrMapOvr>
+    <a:masterClrMapping/>
+  </p:clrMapOvr>
+  <p:timing>
+    <p:tnLst>
+      <p:par>
+        <p:cTn id="1" dur="indefinite" restart="never" nodeType="tmRoot"/>
+      </p:par>
+    </p:tnLst>
+  </p:timing>
+</p:sld>
+</file>
+
 <file path=ppt/slides/slide12.xml><?xml version="1.0" encoding="utf-8"?>
+<p:sld xmlns:a="http://schemas.openxmlformats.org/drawingml/2006/main" xmlns:r="http://schemas.openxmlformats.org/officeDocument/2006/relationships" xmlns:p="http://schemas.openxmlformats.org/presentationml/2006/main">
+  <p:cSld>
+    <p:spTree>
+      <p:nvGrpSpPr>
+        <p:cNvPr id="1" name=""/>
+        <p:cNvGrpSpPr/>
+        <p:nvPr/>
+      </p:nvGrpSpPr>
+      <p:grpSpPr>
+        <a:xfrm>
+          <a:off x="0" y="0"/>
+          <a:ext cx="0" cy="0"/>
+          <a:chOff x="0" y="0"/>
+          <a:chExt cx="0" cy="0"/>
+        </a:xfrm>
+      </p:grpSpPr>
+      <p:pic>
+        <p:nvPicPr>
+          <p:cNvPr id="3" name="図 2"/>
+          <p:cNvPicPr>
+            <a:picLocks noChangeAspect="1"/>
+          </p:cNvPicPr>
+          <p:nvPr/>
+        </p:nvPicPr>
+        <p:blipFill>
+          <a:blip r:embed="rId2">
+            <a:extLst>
+              <a:ext uri="{28A0092B-C50C-407E-A947-70E740481C1C}">
+                <a14:useLocalDpi xmlns:a14="http://schemas.microsoft.com/office/drawing/2010/main" val="0"/>
+              </a:ext>
+            </a:extLst>
+          </a:blip>
+          <a:stretch>
+            <a:fillRect/>
+          </a:stretch>
+        </p:blipFill>
+        <p:spPr>
+          <a:xfrm>
+            <a:off x="481512" y="269456"/>
+            <a:ext cx="7258991" cy="6068516"/>
+          </a:xfrm>
+          <a:prstGeom prst="rect">
+            <a:avLst/>
+          </a:prstGeom>
+        </p:spPr>
+      </p:pic>
+    </p:spTree>
+    <p:extLst>
+      <p:ext uri="{BB962C8B-B14F-4D97-AF65-F5344CB8AC3E}">
+        <p14:creationId xmlns:p14="http://schemas.microsoft.com/office/powerpoint/2010/main" val="1096906843"/>
+      </p:ext>
+    </p:extLst>
+  </p:cSld>
+  <p:clrMapOvr>
+    <a:masterClrMapping/>
+  </p:clrMapOvr>
+  <p:timing>
+    <p:tnLst>
+      <p:par>
+        <p:cTn id="1" dur="indefinite" restart="never" nodeType="tmRoot"/>
+      </p:par>
+    </p:tnLst>
+  </p:timing>
+</p:sld>
+</file>
+
+<file path=ppt/slides/slide13.xml><?xml version="1.0" encoding="utf-8"?>
 <p:sld xmlns:a="http://schemas.openxmlformats.org/drawingml/2006/main" xmlns:r="http://schemas.openxmlformats.org/officeDocument/2006/relationships" xmlns:p="http://schemas.openxmlformats.org/presentationml/2006/main">
   <p:cSld>
     <p:spTree>
@@ -4867,6 +5993,755 @@
     <p:extLst>
       <p:ext uri="{BB962C8B-B14F-4D97-AF65-F5344CB8AC3E}">
         <p14:creationId xmlns:p14="http://schemas.microsoft.com/office/powerpoint/2010/main" val="519102711"/>
+      </p:ext>
+    </p:extLst>
+  </p:cSld>
+  <p:clrMapOvr>
+    <a:masterClrMapping/>
+  </p:clrMapOvr>
+  <p:timing>
+    <p:tnLst>
+      <p:par>
+        <p:cTn id="1" dur="indefinite" restart="never" nodeType="tmRoot"/>
+      </p:par>
+    </p:tnLst>
+  </p:timing>
+</p:sld>
+</file>
+
+<file path=ppt/slides/slide14.xml><?xml version="1.0" encoding="utf-8"?>
+<p:sld xmlns:a="http://schemas.openxmlformats.org/drawingml/2006/main" xmlns:r="http://schemas.openxmlformats.org/officeDocument/2006/relationships" xmlns:p="http://schemas.openxmlformats.org/presentationml/2006/main">
+  <p:cSld>
+    <p:spTree>
+      <p:nvGrpSpPr>
+        <p:cNvPr id="1" name=""/>
+        <p:cNvGrpSpPr/>
+        <p:nvPr/>
+      </p:nvGrpSpPr>
+      <p:grpSpPr>
+        <a:xfrm>
+          <a:off x="0" y="0"/>
+          <a:ext cx="0" cy="0"/>
+          <a:chOff x="0" y="0"/>
+          <a:chExt cx="0" cy="0"/>
+        </a:xfrm>
+      </p:grpSpPr>
+      <p:graphicFrame>
+        <p:nvGraphicFramePr>
+          <p:cNvPr id="12" name="表 11"/>
+          <p:cNvGraphicFramePr>
+            <a:graphicFrameLocks noGrp="1"/>
+          </p:cNvGraphicFramePr>
+          <p:nvPr>
+            <p:extLst>
+              <p:ext uri="{D42A27DB-BD31-4B8C-83A1-F6EECF244321}">
+                <p14:modId xmlns:p14="http://schemas.microsoft.com/office/powerpoint/2010/main" val="234482778"/>
+              </p:ext>
+            </p:extLst>
+          </p:nvPr>
+        </p:nvGraphicFramePr>
+        <p:xfrm>
+          <a:off x="1236977" y="1733477"/>
+          <a:ext cx="8741500" cy="3710394"/>
+        </p:xfrm>
+        <a:graphic>
+          <a:graphicData uri="http://schemas.openxmlformats.org/drawingml/2006/table">
+            <a:tbl>
+              <a:tblPr>
+                <a:tableStyleId>{D7AC3CCA-C797-4891-BE02-D94E43425B78}</a:tableStyleId>
+              </a:tblPr>
+              <a:tblGrid>
+                <a:gridCol w="6303020"/>
+                <a:gridCol w="2438480"/>
+              </a:tblGrid>
+              <a:tr h="412266">
+                <a:tc>
+                  <a:txBody>
+                    <a:bodyPr/>
+                    <a:lstStyle/>
+                    <a:p>
+                      <a:pPr algn="l" fontAlgn="b"/>
+                      <a:endParaRPr lang="en-US" sz="2000" b="0" i="0" u="none" strike="noStrike" dirty="0">
+                        <a:solidFill>
+                          <a:srgbClr val="000000"/>
+                        </a:solidFill>
+                        <a:effectLst/>
+                        <a:latin typeface="Arial" charset="0"/>
+                        <a:ea typeface="Arial" charset="0"/>
+                        <a:cs typeface="Arial" charset="0"/>
+                      </a:endParaRPr>
+                    </a:p>
+                  </a:txBody>
+                  <a:tcPr marL="6350" marR="6350" marT="6350" marB="0" anchor="b">
+                    <a:noFill/>
+                  </a:tcPr>
+                </a:tc>
+                <a:tc>
+                  <a:txBody>
+                    <a:bodyPr/>
+                    <a:lstStyle/>
+                    <a:p>
+                      <a:pPr algn="r" fontAlgn="b"/>
+                      <a:r>
+                        <a:rPr lang="is-IS" sz="2000" u="none" strike="noStrike" dirty="0" smtClean="0">
+                          <a:effectLst/>
+                          <a:latin typeface="Arial" charset="0"/>
+                          <a:ea typeface="Arial" charset="0"/>
+                          <a:cs typeface="Arial" charset="0"/>
+                        </a:rPr>
+                        <a:t>K$</a:t>
+                      </a:r>
+                      <a:endParaRPr lang="is-IS" sz="2000" b="0" i="0" u="none" strike="noStrike" dirty="0">
+                        <a:solidFill>
+                          <a:srgbClr val="000000"/>
+                        </a:solidFill>
+                        <a:effectLst/>
+                        <a:latin typeface="Arial" charset="0"/>
+                        <a:ea typeface="Arial" charset="0"/>
+                        <a:cs typeface="Arial" charset="0"/>
+                      </a:endParaRPr>
+                    </a:p>
+                  </a:txBody>
+                  <a:tcPr marL="6350" marR="6350" marT="6350" marB="0" anchor="b">
+                    <a:noFill/>
+                  </a:tcPr>
+                </a:tc>
+              </a:tr>
+              <a:tr h="412266">
+                <a:tc>
+                  <a:txBody>
+                    <a:bodyPr/>
+                    <a:lstStyle/>
+                    <a:p>
+                      <a:pPr algn="l" fontAlgn="b"/>
+                      <a:r>
+                        <a:rPr lang="en-US" sz="2000" u="none" strike="noStrike" dirty="0">
+                          <a:effectLst/>
+                          <a:latin typeface="Arial" charset="0"/>
+                          <a:ea typeface="Arial" charset="0"/>
+                          <a:cs typeface="Arial" charset="0"/>
+                        </a:rPr>
+                        <a:t>ARR </a:t>
+                      </a:r>
+                      <a:r>
+                        <a:rPr lang="en-US" sz="2000" u="none" strike="noStrike" dirty="0" err="1">
+                          <a:effectLst/>
+                          <a:latin typeface="Arial" charset="0"/>
+                          <a:ea typeface="Arial" charset="0"/>
+                          <a:cs typeface="Arial" charset="0"/>
+                        </a:rPr>
+                        <a:t>Traget</a:t>
+                      </a:r>
+                      <a:endParaRPr lang="en-US" sz="2000" b="0" i="0" u="none" strike="noStrike" dirty="0">
+                        <a:solidFill>
+                          <a:srgbClr val="000000"/>
+                        </a:solidFill>
+                        <a:effectLst/>
+                        <a:latin typeface="Arial" charset="0"/>
+                        <a:ea typeface="Arial" charset="0"/>
+                        <a:cs typeface="Arial" charset="0"/>
+                      </a:endParaRPr>
+                    </a:p>
+                  </a:txBody>
+                  <a:tcPr marL="6350" marR="6350" marT="6350" marB="0" anchor="b"/>
+                </a:tc>
+                <a:tc>
+                  <a:txBody>
+                    <a:bodyPr/>
+                    <a:lstStyle/>
+                    <a:p>
+                      <a:pPr algn="r" fontAlgn="b"/>
+                      <a:r>
+                        <a:rPr lang="is-IS" sz="2000" b="0" i="0" u="none" strike="noStrike" dirty="0" smtClean="0">
+                          <a:solidFill>
+                            <a:schemeClr val="dk1"/>
+                          </a:solidFill>
+                          <a:effectLst/>
+                          <a:latin typeface="Arial" charset="0"/>
+                          <a:ea typeface="Arial" charset="0"/>
+                          <a:cs typeface="Arial" charset="0"/>
+                        </a:rPr>
+                        <a:t>10,000</a:t>
+                      </a:r>
+                      <a:endParaRPr lang="is-IS" sz="2000" b="0" i="0" u="none" strike="noStrike" dirty="0">
+                        <a:solidFill>
+                          <a:srgbClr val="000000"/>
+                        </a:solidFill>
+                        <a:effectLst/>
+                        <a:latin typeface="Arial" charset="0"/>
+                        <a:ea typeface="Arial" charset="0"/>
+                        <a:cs typeface="Arial" charset="0"/>
+                      </a:endParaRPr>
+                    </a:p>
+                  </a:txBody>
+                  <a:tcPr marL="6350" marR="6350" marT="6350" marB="0" anchor="b"/>
+                </a:tc>
+              </a:tr>
+              <a:tr h="412266">
+                <a:tc>
+                  <a:txBody>
+                    <a:bodyPr/>
+                    <a:lstStyle/>
+                    <a:p>
+                      <a:pPr algn="l" fontAlgn="b"/>
+                      <a:r>
+                        <a:rPr lang="en-US" sz="2000" u="none" strike="noStrike" dirty="0">
+                          <a:effectLst/>
+                          <a:latin typeface="Arial" charset="0"/>
+                          <a:ea typeface="Arial" charset="0"/>
+                          <a:cs typeface="Arial" charset="0"/>
+                        </a:rPr>
+                        <a:t>Average Deal Size</a:t>
+                      </a:r>
+                      <a:endParaRPr lang="en-US" sz="2000" b="0" i="0" u="none" strike="noStrike" dirty="0">
+                        <a:solidFill>
+                          <a:srgbClr val="000000"/>
+                        </a:solidFill>
+                        <a:effectLst/>
+                        <a:latin typeface="Arial" charset="0"/>
+                        <a:ea typeface="Arial" charset="0"/>
+                        <a:cs typeface="Arial" charset="0"/>
+                      </a:endParaRPr>
+                    </a:p>
+                  </a:txBody>
+                  <a:tcPr marL="6350" marR="6350" marT="6350" marB="0" anchor="b"/>
+                </a:tc>
+                <a:tc>
+                  <a:txBody>
+                    <a:bodyPr/>
+                    <a:lstStyle/>
+                    <a:p>
+                      <a:pPr algn="r" fontAlgn="b"/>
+                      <a:r>
+                        <a:rPr lang="is-IS" sz="2000" b="0" i="0" u="none" strike="noStrike" dirty="0" smtClean="0">
+                          <a:solidFill>
+                            <a:srgbClr val="000000"/>
+                          </a:solidFill>
+                          <a:effectLst/>
+                          <a:latin typeface="Arial" charset="0"/>
+                          <a:ea typeface="Arial" charset="0"/>
+                          <a:cs typeface="Arial" charset="0"/>
+                        </a:rPr>
+                        <a:t>140</a:t>
+                      </a:r>
+                      <a:endParaRPr lang="is-IS" sz="2000" b="0" i="0" u="none" strike="noStrike" dirty="0">
+                        <a:solidFill>
+                          <a:srgbClr val="000000"/>
+                        </a:solidFill>
+                        <a:effectLst/>
+                        <a:latin typeface="Arial" charset="0"/>
+                        <a:ea typeface="Arial" charset="0"/>
+                        <a:cs typeface="Arial" charset="0"/>
+                      </a:endParaRPr>
+                    </a:p>
+                  </a:txBody>
+                  <a:tcPr marL="6350" marR="6350" marT="6350" marB="0" anchor="b"/>
+                </a:tc>
+              </a:tr>
+              <a:tr h="412266">
+                <a:tc>
+                  <a:txBody>
+                    <a:bodyPr/>
+                    <a:lstStyle/>
+                    <a:p>
+                      <a:pPr algn="l" fontAlgn="b"/>
+                      <a:endParaRPr lang="en-US" sz="2000" b="0" i="0" u="none" strike="noStrike" dirty="0">
+                        <a:solidFill>
+                          <a:srgbClr val="000000"/>
+                        </a:solidFill>
+                        <a:effectLst/>
+                        <a:latin typeface="Arial" charset="0"/>
+                        <a:ea typeface="Arial" charset="0"/>
+                        <a:cs typeface="Arial" charset="0"/>
+                      </a:endParaRPr>
+                    </a:p>
+                  </a:txBody>
+                  <a:tcPr marL="6350" marR="6350" marT="6350" marB="0" anchor="b"/>
+                </a:tc>
+                <a:tc>
+                  <a:txBody>
+                    <a:bodyPr/>
+                    <a:lstStyle/>
+                    <a:p>
+                      <a:pPr algn="r" fontAlgn="b"/>
+                      <a:endParaRPr lang="is-IS" sz="2000" b="0" i="0" u="none" strike="noStrike" dirty="0">
+                        <a:solidFill>
+                          <a:srgbClr val="000000"/>
+                        </a:solidFill>
+                        <a:effectLst/>
+                        <a:latin typeface="Arial" charset="0"/>
+                        <a:ea typeface="Arial" charset="0"/>
+                        <a:cs typeface="Arial" charset="0"/>
+                      </a:endParaRPr>
+                    </a:p>
+                  </a:txBody>
+                  <a:tcPr marL="6350" marR="6350" marT="6350" marB="0" anchor="b"/>
+                </a:tc>
+              </a:tr>
+              <a:tr h="412266">
+                <a:tc>
+                  <a:txBody>
+                    <a:bodyPr/>
+                    <a:lstStyle/>
+                    <a:p>
+                      <a:pPr algn="l" fontAlgn="b"/>
+                      <a:endParaRPr lang="en-US" sz="2000" b="0" i="0" u="none" strike="noStrike" dirty="0">
+                        <a:solidFill>
+                          <a:srgbClr val="000000"/>
+                        </a:solidFill>
+                        <a:effectLst/>
+                        <a:latin typeface="Arial" charset="0"/>
+                        <a:ea typeface="Arial" charset="0"/>
+                        <a:cs typeface="Arial" charset="0"/>
+                      </a:endParaRPr>
+                    </a:p>
+                  </a:txBody>
+                  <a:tcPr marL="6350" marR="6350" marT="6350" marB="0" anchor="b"/>
+                </a:tc>
+                <a:tc>
+                  <a:txBody>
+                    <a:bodyPr/>
+                    <a:lstStyle/>
+                    <a:p>
+                      <a:pPr algn="r" fontAlgn="b"/>
+                      <a:endParaRPr lang="fi-FI" sz="2000" b="0" i="0" u="none" strike="noStrike" dirty="0">
+                        <a:solidFill>
+                          <a:srgbClr val="000000"/>
+                        </a:solidFill>
+                        <a:effectLst/>
+                        <a:latin typeface="Arial" charset="0"/>
+                        <a:ea typeface="Arial" charset="0"/>
+                        <a:cs typeface="Arial" charset="0"/>
+                      </a:endParaRPr>
+                    </a:p>
+                  </a:txBody>
+                  <a:tcPr marL="6350" marR="6350" marT="6350" marB="0" anchor="b"/>
+                </a:tc>
+              </a:tr>
+              <a:tr h="412266">
+                <a:tc>
+                  <a:txBody>
+                    <a:bodyPr/>
+                    <a:lstStyle/>
+                    <a:p>
+                      <a:pPr algn="l" fontAlgn="b"/>
+                      <a:endParaRPr lang="en-US" sz="2000" b="0" i="0" u="none" strike="noStrike" dirty="0">
+                        <a:solidFill>
+                          <a:srgbClr val="000000"/>
+                        </a:solidFill>
+                        <a:effectLst/>
+                        <a:latin typeface="Arial" charset="0"/>
+                        <a:ea typeface="Arial" charset="0"/>
+                        <a:cs typeface="Arial" charset="0"/>
+                      </a:endParaRPr>
+                    </a:p>
+                  </a:txBody>
+                  <a:tcPr marL="6350" marR="6350" marT="6350" marB="0" anchor="b"/>
+                </a:tc>
+                <a:tc>
+                  <a:txBody>
+                    <a:bodyPr/>
+                    <a:lstStyle/>
+                    <a:p>
+                      <a:pPr algn="r" fontAlgn="b"/>
+                      <a:endParaRPr lang="en-US" sz="2000" b="0" i="0" u="none" strike="noStrike" dirty="0">
+                        <a:solidFill>
+                          <a:srgbClr val="000000"/>
+                        </a:solidFill>
+                        <a:effectLst/>
+                        <a:latin typeface="Arial" charset="0"/>
+                        <a:ea typeface="Arial" charset="0"/>
+                        <a:cs typeface="Arial" charset="0"/>
+                      </a:endParaRPr>
+                    </a:p>
+                  </a:txBody>
+                  <a:tcPr marL="6350" marR="6350" marT="6350" marB="0" anchor="b"/>
+                </a:tc>
+              </a:tr>
+              <a:tr h="412266">
+                <a:tc>
+                  <a:txBody>
+                    <a:bodyPr/>
+                    <a:lstStyle/>
+                    <a:p>
+                      <a:pPr algn="l" fontAlgn="b"/>
+                      <a:endParaRPr lang="en-US" sz="2000" b="0" i="0" u="none" strike="noStrike">
+                        <a:solidFill>
+                          <a:srgbClr val="000000"/>
+                        </a:solidFill>
+                        <a:effectLst/>
+                        <a:latin typeface="Arial" charset="0"/>
+                        <a:ea typeface="Arial" charset="0"/>
+                        <a:cs typeface="Arial" charset="0"/>
+                      </a:endParaRPr>
+                    </a:p>
+                  </a:txBody>
+                  <a:tcPr marL="6350" marR="6350" marT="6350" marB="0" anchor="b"/>
+                </a:tc>
+                <a:tc>
+                  <a:txBody>
+                    <a:bodyPr/>
+                    <a:lstStyle/>
+                    <a:p>
+                      <a:pPr algn="r" fontAlgn="b"/>
+                      <a:endParaRPr lang="is-IS" sz="2000" b="0" i="0" u="none" strike="noStrike" dirty="0">
+                        <a:solidFill>
+                          <a:srgbClr val="000000"/>
+                        </a:solidFill>
+                        <a:effectLst/>
+                        <a:latin typeface="Arial" charset="0"/>
+                        <a:ea typeface="Arial" charset="0"/>
+                        <a:cs typeface="Arial" charset="0"/>
+                      </a:endParaRPr>
+                    </a:p>
+                  </a:txBody>
+                  <a:tcPr marL="6350" marR="6350" marT="6350" marB="0" anchor="b"/>
+                </a:tc>
+              </a:tr>
+              <a:tr h="412266">
+                <a:tc>
+                  <a:txBody>
+                    <a:bodyPr/>
+                    <a:lstStyle/>
+                    <a:p>
+                      <a:pPr algn="l" fontAlgn="b"/>
+                      <a:endParaRPr lang="en-US" sz="2000" b="0" i="0" u="none" strike="noStrike">
+                        <a:solidFill>
+                          <a:srgbClr val="000000"/>
+                        </a:solidFill>
+                        <a:effectLst/>
+                        <a:latin typeface="Arial" charset="0"/>
+                        <a:ea typeface="Arial" charset="0"/>
+                        <a:cs typeface="Arial" charset="0"/>
+                      </a:endParaRPr>
+                    </a:p>
+                  </a:txBody>
+                  <a:tcPr marL="6350" marR="6350" marT="6350" marB="0" anchor="b"/>
+                </a:tc>
+                <a:tc>
+                  <a:txBody>
+                    <a:bodyPr/>
+                    <a:lstStyle/>
+                    <a:p>
+                      <a:pPr algn="r" fontAlgn="b"/>
+                      <a:endParaRPr lang="fi-FI" sz="2000" b="0" i="0" u="none" strike="noStrike" dirty="0">
+                        <a:solidFill>
+                          <a:srgbClr val="000000"/>
+                        </a:solidFill>
+                        <a:effectLst/>
+                        <a:latin typeface="Arial" charset="0"/>
+                        <a:ea typeface="Arial" charset="0"/>
+                        <a:cs typeface="Arial" charset="0"/>
+                      </a:endParaRPr>
+                    </a:p>
+                  </a:txBody>
+                  <a:tcPr marL="6350" marR="6350" marT="6350" marB="0" anchor="b"/>
+                </a:tc>
+              </a:tr>
+              <a:tr h="412266">
+                <a:tc>
+                  <a:txBody>
+                    <a:bodyPr/>
+                    <a:lstStyle/>
+                    <a:p>
+                      <a:pPr algn="l" fontAlgn="b"/>
+                      <a:endParaRPr lang="en-US" sz="2000" b="0" i="0" u="none" strike="noStrike">
+                        <a:solidFill>
+                          <a:srgbClr val="000000"/>
+                        </a:solidFill>
+                        <a:effectLst/>
+                        <a:latin typeface="Arial" charset="0"/>
+                        <a:ea typeface="Arial" charset="0"/>
+                        <a:cs typeface="Arial" charset="0"/>
+                      </a:endParaRPr>
+                    </a:p>
+                  </a:txBody>
+                  <a:tcPr marL="6350" marR="6350" marT="6350" marB="0" anchor="b"/>
+                </a:tc>
+                <a:tc>
+                  <a:txBody>
+                    <a:bodyPr/>
+                    <a:lstStyle/>
+                    <a:p>
+                      <a:pPr algn="r" fontAlgn="b"/>
+                      <a:endParaRPr lang="is-IS" sz="2000" b="0" i="0" u="none" strike="noStrike" dirty="0">
+                        <a:solidFill>
+                          <a:srgbClr val="000000"/>
+                        </a:solidFill>
+                        <a:effectLst/>
+                        <a:latin typeface="Arial" charset="0"/>
+                        <a:ea typeface="Arial" charset="0"/>
+                        <a:cs typeface="Arial" charset="0"/>
+                      </a:endParaRPr>
+                    </a:p>
+                  </a:txBody>
+                  <a:tcPr marL="6350" marR="6350" marT="6350" marB="0" anchor="b"/>
+                </a:tc>
+              </a:tr>
+            </a:tbl>
+          </a:graphicData>
+        </a:graphic>
+      </p:graphicFrame>
+      <p:sp>
+        <p:nvSpPr>
+          <p:cNvPr id="2" name="Title 1"/>
+          <p:cNvSpPr>
+            <a:spLocks noGrp="1"/>
+          </p:cNvSpPr>
+          <p:nvPr>
+            <p:ph type="title"/>
+          </p:nvPr>
+        </p:nvSpPr>
+        <p:spPr>
+          <a:xfrm>
+            <a:off x="322023" y="328628"/>
+            <a:ext cx="11426632" cy="605294"/>
+          </a:xfrm>
+        </p:spPr>
+        <p:txBody>
+          <a:bodyPr/>
+          <a:lstStyle/>
+          <a:p>
+            <a:r>
+              <a:rPr lang="en-US" altLang="ja-JP" sz="3200" b="1" dirty="0" smtClean="0">
+                <a:solidFill>
+                  <a:srgbClr val="00B0F0"/>
+                </a:solidFill>
+                <a:latin typeface="Arial" charset="0"/>
+                <a:ea typeface="Arial" charset="0"/>
+                <a:cs typeface="Arial" charset="0"/>
+              </a:rPr>
+              <a:t>2017 Japan Revenue </a:t>
+            </a:r>
+            <a:r>
+              <a:rPr lang="en-US" altLang="ja-JP" sz="3200" b="1" dirty="0">
+                <a:solidFill>
+                  <a:srgbClr val="00B0F0"/>
+                </a:solidFill>
+                <a:latin typeface="Arial" charset="0"/>
+                <a:ea typeface="Arial" charset="0"/>
+                <a:cs typeface="Arial" charset="0"/>
+              </a:rPr>
+              <a:t>Target </a:t>
+            </a:r>
+            <a:r>
+              <a:rPr lang="en-US" altLang="ja-JP" sz="3200" b="1" dirty="0" smtClean="0">
+                <a:solidFill>
+                  <a:srgbClr val="00B0F0"/>
+                </a:solidFill>
+                <a:latin typeface="Arial" charset="0"/>
+                <a:ea typeface="Arial" charset="0"/>
+                <a:cs typeface="Arial" charset="0"/>
+              </a:rPr>
+              <a:t>&amp; Marketing </a:t>
+            </a:r>
+            <a:r>
+              <a:rPr lang="en-US" altLang="ja-JP" sz="3200" b="1" dirty="0">
+                <a:solidFill>
+                  <a:srgbClr val="00B0F0"/>
+                </a:solidFill>
+                <a:latin typeface="Arial" charset="0"/>
+                <a:ea typeface="Arial" charset="0"/>
+                <a:cs typeface="Arial" charset="0"/>
+              </a:rPr>
+              <a:t>Contribution</a:t>
+            </a:r>
+          </a:p>
+        </p:txBody>
+      </p:sp>
+      <p:sp>
+        <p:nvSpPr>
+          <p:cNvPr id="6" name="Rectangle 9"/>
+          <p:cNvSpPr/>
+          <p:nvPr/>
+        </p:nvSpPr>
+        <p:spPr>
+          <a:xfrm>
+            <a:off x="11647754" y="6596555"/>
+            <a:ext cx="410749" cy="138499"/>
+          </a:xfrm>
+          <a:prstGeom prst="rect">
+            <a:avLst/>
+          </a:prstGeom>
+        </p:spPr>
+        <p:txBody>
+          <a:bodyPr wrap="square" lIns="0" tIns="0" rIns="0" bIns="0">
+            <a:spAutoFit/>
+          </a:bodyPr>
+          <a:lstStyle/>
+          <a:p>
+            <a:fld id="{655362CE-4ABE-4CB4-8947-B1242CDD9D94}" type="slidenum">
+              <a:rPr kumimoji="0" lang="en-US" sz="900" smtClean="0">
+                <a:solidFill>
+                  <a:srgbClr val="5A5A5A"/>
+                </a:solidFill>
+                <a:latin typeface="Arial" charset="0"/>
+                <a:ea typeface="Arial" charset="0"/>
+                <a:cs typeface="Arial" charset="0"/>
+              </a:rPr>
+              <a:pPr/>
+              <a:t>14</a:t>
+            </a:fld>
+            <a:endParaRPr kumimoji="0" lang="en-US" sz="900" dirty="0">
+              <a:solidFill>
+                <a:srgbClr val="5A5A5A"/>
+              </a:solidFill>
+              <a:latin typeface="Arial" charset="0"/>
+              <a:ea typeface="Arial" charset="0"/>
+              <a:cs typeface="Arial" charset="0"/>
+            </a:endParaRPr>
+          </a:p>
+        </p:txBody>
+      </p:sp>
+      <p:sp>
+        <p:nvSpPr>
+          <p:cNvPr id="7" name="Rectangle 14"/>
+          <p:cNvSpPr/>
+          <p:nvPr/>
+        </p:nvSpPr>
+        <p:spPr>
+          <a:xfrm>
+            <a:off x="11291779" y="6596555"/>
+            <a:ext cx="380848" cy="138499"/>
+          </a:xfrm>
+          <a:prstGeom prst="rect">
+            <a:avLst/>
+          </a:prstGeom>
+        </p:spPr>
+        <p:txBody>
+          <a:bodyPr wrap="square" lIns="0" tIns="0" rIns="0" bIns="0">
+            <a:spAutoFit/>
+          </a:bodyPr>
+          <a:lstStyle/>
+          <a:p>
+            <a:r>
+              <a:rPr kumimoji="0" lang="en-US" sz="900" dirty="0" smtClean="0">
+                <a:solidFill>
+                  <a:srgbClr val="5A5A5A"/>
+                </a:solidFill>
+                <a:latin typeface="Arial" charset="0"/>
+                <a:ea typeface="Arial" charset="0"/>
+                <a:cs typeface="Arial" charset="0"/>
+              </a:rPr>
+              <a:t>Page</a:t>
+            </a:r>
+            <a:endParaRPr kumimoji="0" lang="en-US" sz="900" dirty="0">
+              <a:solidFill>
+                <a:srgbClr val="5A5A5A"/>
+              </a:solidFill>
+              <a:latin typeface="Arial" charset="0"/>
+              <a:ea typeface="Arial" charset="0"/>
+              <a:cs typeface="Arial" charset="0"/>
+            </a:endParaRPr>
+          </a:p>
+        </p:txBody>
+      </p:sp>
+      <p:sp>
+        <p:nvSpPr>
+          <p:cNvPr id="8" name="Rectangle 9"/>
+          <p:cNvSpPr/>
+          <p:nvPr/>
+        </p:nvSpPr>
+        <p:spPr>
+          <a:xfrm>
+            <a:off x="11800154" y="6748955"/>
+            <a:ext cx="410749" cy="138499"/>
+          </a:xfrm>
+          <a:prstGeom prst="rect">
+            <a:avLst/>
+          </a:prstGeom>
+        </p:spPr>
+        <p:txBody>
+          <a:bodyPr wrap="square" lIns="0" tIns="0" rIns="0" bIns="0">
+            <a:spAutoFit/>
+          </a:bodyPr>
+          <a:lstStyle/>
+          <a:p>
+            <a:fld id="{655362CE-4ABE-4CB4-8947-B1242CDD9D94}" type="slidenum">
+              <a:rPr kumimoji="0" lang="en-US" sz="900" smtClean="0">
+                <a:solidFill>
+                  <a:srgbClr val="5A5A5A"/>
+                </a:solidFill>
+                <a:latin typeface="Arial" charset="0"/>
+                <a:ea typeface="Arial" charset="0"/>
+                <a:cs typeface="Arial" charset="0"/>
+              </a:rPr>
+              <a:pPr/>
+              <a:t>14</a:t>
+            </a:fld>
+            <a:endParaRPr kumimoji="0" lang="en-US" sz="900" dirty="0">
+              <a:solidFill>
+                <a:srgbClr val="5A5A5A"/>
+              </a:solidFill>
+              <a:latin typeface="Arial" charset="0"/>
+              <a:ea typeface="Arial" charset="0"/>
+              <a:cs typeface="Arial" charset="0"/>
+            </a:endParaRPr>
+          </a:p>
+        </p:txBody>
+      </p:sp>
+      <p:sp>
+        <p:nvSpPr>
+          <p:cNvPr id="9" name="角丸四角形 8"/>
+          <p:cNvSpPr/>
+          <p:nvPr/>
+        </p:nvSpPr>
+        <p:spPr>
+          <a:xfrm>
+            <a:off x="10302948" y="19943"/>
+            <a:ext cx="1889051" cy="716526"/>
+          </a:xfrm>
+          <a:prstGeom prst="roundRect">
+            <a:avLst/>
+          </a:prstGeom>
+          <a:solidFill>
+            <a:schemeClr val="accent2"/>
+          </a:solidFill>
+          <a:ln>
+            <a:noFill/>
+          </a:ln>
+        </p:spPr>
+        <p:style>
+          <a:lnRef idx="2">
+            <a:schemeClr val="accent1">
+              <a:shade val="50000"/>
+            </a:schemeClr>
+          </a:lnRef>
+          <a:fillRef idx="1">
+            <a:schemeClr val="accent1"/>
+          </a:fillRef>
+          <a:effectRef idx="0">
+            <a:schemeClr val="accent1"/>
+          </a:effectRef>
+          <a:fontRef idx="minor">
+            <a:schemeClr val="lt1"/>
+          </a:fontRef>
+        </p:style>
+        <p:txBody>
+          <a:bodyPr rtlCol="0" anchor="ctr"/>
+          <a:lstStyle/>
+          <a:p>
+            <a:pPr algn="ctr"/>
+            <a:r>
+              <a:rPr kumimoji="1" lang="en-US" altLang="ja-JP" sz="2800" dirty="0" smtClean="0">
+                <a:latin typeface="Arial" charset="0"/>
+                <a:ea typeface="Arial" charset="0"/>
+                <a:cs typeface="Arial" charset="0"/>
+              </a:rPr>
+              <a:t>WIP</a:t>
+            </a:r>
+            <a:endParaRPr kumimoji="1" lang="ja-JP" altLang="en-US" sz="2800" dirty="0">
+              <a:latin typeface="Arial" charset="0"/>
+              <a:ea typeface="Arial" charset="0"/>
+              <a:cs typeface="Arial" charset="0"/>
+            </a:endParaRPr>
+          </a:p>
+        </p:txBody>
+      </p:sp>
+    </p:spTree>
+    <p:extLst>
+      <p:ext uri="{BB962C8B-B14F-4D97-AF65-F5344CB8AC3E}">
+        <p14:creationId xmlns:p14="http://schemas.microsoft.com/office/powerpoint/2010/main" val="841811139"/>
       </p:ext>
     </p:extLst>
   </p:cSld>
@@ -8372,7 +10247,7 @@
           <p:nvPr>
             <p:extLst>
               <p:ext uri="{D42A27DB-BD31-4B8C-83A1-F6EECF244321}">
-                <p14:modId xmlns:p14="http://schemas.microsoft.com/office/powerpoint/2010/main" val="1999474590"/>
+                <p14:modId xmlns:p14="http://schemas.microsoft.com/office/powerpoint/2010/main" val="811096976"/>
               </p:ext>
             </p:extLst>
           </p:nvPr>
@@ -9010,7 +10885,7 @@
                           <a:ea typeface="Arial" charset="0"/>
                           <a:cs typeface="Arial" charset="0"/>
                         </a:rPr>
-                        <a:t>Mid ?</a:t>
+                        <a:t>Low ?</a:t>
                       </a:r>
                       <a:endParaRPr kumimoji="1" lang="ja-JP" altLang="en-US" sz="1000" b="0" dirty="0">
                         <a:latin typeface="Arial" charset="0"/>
@@ -10319,14 +12194,14 @@
           <p:nvPr>
             <p:extLst>
               <p:ext uri="{D42A27DB-BD31-4B8C-83A1-F6EECF244321}">
-                <p14:modId xmlns:p14="http://schemas.microsoft.com/office/powerpoint/2010/main" val="1829083509"/>
+                <p14:modId xmlns:p14="http://schemas.microsoft.com/office/powerpoint/2010/main" val="1240331591"/>
               </p:ext>
             </p:extLst>
           </p:nvPr>
         </p:nvGraphicFramePr>
         <p:xfrm>
           <a:off x="6337130" y="4258394"/>
-          <a:ext cx="4832812" cy="1737360"/>
+          <a:ext cx="4832812" cy="1905000"/>
         </p:xfrm>
         <a:graphic>
           <a:graphicData uri="http://schemas.openxmlformats.org/drawingml/2006/table">
@@ -10550,6 +12425,14 @@
                         </a:rPr>
                         <a:t>Content localization: things like documentation, collateral support</a:t>
                       </a:r>
+                      <a:r>
+                        <a:rPr kumimoji="1" lang="en-US" altLang="ja-JP" sz="1100" baseline="0" dirty="0" smtClean="0">
+                          <a:latin typeface="Arial" charset="0"/>
+                          <a:ea typeface="Arial" charset="0"/>
+                          <a:cs typeface="Arial" charset="0"/>
+                        </a:rPr>
+                        <a:t> and owned web</a:t>
+                      </a:r>
                       <a:endParaRPr kumimoji="1" lang="ja-JP" altLang="en-US" sz="1100" dirty="0">
                         <a:latin typeface="Arial" charset="0"/>
                         <a:ea typeface="Arial" charset="0"/>
@@ -10723,9 +12606,9 @@
           <p:nvPr/>
         </p:nvSpPr>
         <p:spPr>
-          <a:xfrm rot="20584952">
-            <a:off x="4470129" y="3165869"/>
-            <a:ext cx="3511296" cy="716526"/>
+          <a:xfrm>
+            <a:off x="10302948" y="19943"/>
+            <a:ext cx="1889051" cy="716526"/>
           </a:xfrm>
           <a:prstGeom prst="roundRect">
             <a:avLst/>
@@ -14985,35 +16868,8 @@
                           <a:ea typeface="Arial" charset="0"/>
                           <a:cs typeface="Arial" charset="0"/>
                         </a:rPr>
-                        <a:t>GitHub </a:t>
+                        <a:t>GitHub Universe 2017</a:t>
                       </a:r>
-                      <a:r>
-                        <a:rPr kumimoji="0" lang="en-US" altLang="ja-JP" sz="1200" b="0" i="0" u="none" strike="noStrike" cap="none" normalizeH="0" baseline="0" dirty="0" smtClean="0">
-                          <a:ln>
-                            <a:noFill/>
-                          </a:ln>
-                          <a:solidFill>
-                            <a:schemeClr val="tx1"/>
-                          </a:solidFill>
-                          <a:effectLst/>
-                          <a:latin typeface="Arial" charset="0"/>
-                          <a:ea typeface="Arial" charset="0"/>
-                          <a:cs typeface="Arial" charset="0"/>
-                        </a:rPr>
-                        <a:t>Universe 2017</a:t>
-                      </a:r>
-                      <a:endParaRPr kumimoji="0" lang="en-US" altLang="ja-JP" sz="1200" b="0" i="0" u="none" strike="noStrike" cap="none" normalizeH="0" baseline="0" dirty="0" smtClean="0">
-                        <a:ln>
-                          <a:noFill/>
-                        </a:ln>
-                        <a:solidFill>
-                          <a:schemeClr val="tx1"/>
-                        </a:solidFill>
-                        <a:effectLst/>
-                        <a:latin typeface="Arial" charset="0"/>
-                        <a:ea typeface="Arial" charset="0"/>
-                        <a:cs typeface="Arial" charset="0"/>
-                      </a:endParaRPr>
                     </a:p>
                     <a:p>
                       <a:pPr marL="0" marR="0" lvl="0" indent="0" algn="l" defTabSz="914400" rtl="0" eaLnBrk="1" fontAlgn="base" latinLnBrk="0" hangingPunct="1">
@@ -15596,18 +17452,6 @@
                         </a:rPr>
                         <a:t>GitHub Satellite 2018 Tokyo</a:t>
                       </a:r>
-                      <a:endParaRPr kumimoji="0" lang="en-US" altLang="ja-JP" sz="1200" b="1" i="0" u="none" strike="noStrike" cap="none" normalizeH="0" baseline="0" dirty="0" smtClean="0">
-                        <a:ln>
-                          <a:noFill/>
-                        </a:ln>
-                        <a:solidFill>
-                          <a:schemeClr val="tx1"/>
-                        </a:solidFill>
-                        <a:effectLst/>
-                        <a:latin typeface="Arial" charset="0"/>
-                        <a:ea typeface="Arial" charset="0"/>
-                        <a:cs typeface="Arial" charset="0"/>
-                      </a:endParaRPr>
                     </a:p>
                     <a:p>
                       <a:pPr marL="0" marR="0" lvl="0" indent="0" algn="l" defTabSz="914400" rtl="0" eaLnBrk="1" fontAlgn="base" latinLnBrk="0" hangingPunct="1">
@@ -25643,64 +27487,6 @@
       </p:sp>
       <p:sp>
         <p:nvSpPr>
-          <p:cNvPr id="21" name="角丸四角形 20"/>
-          <p:cNvSpPr/>
-          <p:nvPr/>
-        </p:nvSpPr>
-        <p:spPr>
-          <a:xfrm rot="20584952">
-            <a:off x="5117148" y="4134121"/>
-            <a:ext cx="3511296" cy="716526"/>
-          </a:xfrm>
-          <a:prstGeom prst="roundRect">
-            <a:avLst/>
-          </a:prstGeom>
-          <a:solidFill>
-            <a:schemeClr val="accent2"/>
-          </a:solidFill>
-          <a:ln>
-            <a:noFill/>
-          </a:ln>
-        </p:spPr>
-        <p:style>
-          <a:lnRef idx="2">
-            <a:schemeClr val="accent1">
-              <a:shade val="50000"/>
-            </a:schemeClr>
-          </a:lnRef>
-          <a:fillRef idx="1">
-            <a:schemeClr val="accent1"/>
-          </a:fillRef>
-          <a:effectRef idx="0">
-            <a:schemeClr val="accent1"/>
-          </a:effectRef>
-          <a:fontRef idx="minor">
-            <a:schemeClr val="lt1"/>
-          </a:fontRef>
-        </p:style>
-        <p:txBody>
-          <a:bodyPr rtlCol="0" anchor="ctr"/>
-          <a:lstStyle/>
-          <a:p>
-            <a:pPr algn="ctr"/>
-            <a:r>
-              <a:rPr kumimoji="1" lang="en-US" altLang="ja-JP" sz="2800" dirty="0" smtClean="0">
-                <a:latin typeface="Arial" charset="0"/>
-                <a:ea typeface="Arial" charset="0"/>
-                <a:cs typeface="Arial" charset="0"/>
-              </a:rPr>
-              <a:t>WIP</a:t>
-            </a:r>
-            <a:endParaRPr kumimoji="1" lang="ja-JP" altLang="en-US" sz="2800" dirty="0">
-              <a:latin typeface="Arial" charset="0"/>
-              <a:ea typeface="Arial" charset="0"/>
-              <a:cs typeface="Arial" charset="0"/>
-            </a:endParaRPr>
-          </a:p>
-        </p:txBody>
-      </p:sp>
-      <p:sp>
-        <p:nvSpPr>
           <p:cNvPr id="6" name="TextBox 31"/>
           <p:cNvSpPr txBox="1"/>
           <p:nvPr/>
@@ -25976,11 +27762,6 @@
               </a:rPr>
               <a:t>eb seminar series(Live and On-Demand)</a:t>
             </a:r>
-            <a:endParaRPr lang="en-US" altLang="ja-JP" sz="1100" b="1" dirty="0" smtClean="0">
-              <a:latin typeface="Arial" charset="0"/>
-              <a:ea typeface="Arial" charset="0"/>
-              <a:cs typeface="Arial" charset="0"/>
-            </a:endParaRPr>
           </a:p>
         </p:txBody>
       </p:sp>
@@ -26020,15 +27801,7 @@
                 <a:ea typeface="Arial" charset="0"/>
                 <a:cs typeface="Arial" charset="0"/>
               </a:rPr>
-              <a:t>special feature article on WIRED </a:t>
-            </a:r>
-            <a:r>
-              <a:rPr lang="en-US" altLang="ja-JP" sz="1100" b="1" dirty="0" smtClean="0">
-                <a:latin typeface="Arial" charset="0"/>
-                <a:ea typeface="Arial" charset="0"/>
-                <a:cs typeface="Arial" charset="0"/>
-              </a:rPr>
-              <a:t>Japan</a:t>
+              <a:t>special feature article on WIRED Japan</a:t>
             </a:r>
           </a:p>
         </p:txBody>
@@ -26077,21 +27850,8 @@
                 <a:ea typeface="Arial" charset="0"/>
                 <a:cs typeface="Arial" charset="0"/>
               </a:rPr>
-              <a:t>Seminar/w </a:t>
-            </a:r>
-            <a:r>
-              <a:rPr lang="en-US" altLang="ja-JP" sz="1100" b="1" dirty="0" smtClean="0">
-                <a:latin typeface="Arial" charset="0"/>
-                <a:ea typeface="Arial" charset="0"/>
-                <a:cs typeface="Arial" charset="0"/>
-              </a:rPr>
-              <a:t>IBM</a:t>
-            </a:r>
-            <a:endParaRPr lang="en-US" altLang="ja-JP" sz="1100" b="1" dirty="0" smtClean="0">
-              <a:latin typeface="Arial" charset="0"/>
-              <a:ea typeface="Arial" charset="0"/>
-              <a:cs typeface="Arial" charset="0"/>
-            </a:endParaRPr>
+              <a:t>Seminar/w IBM</a:t>
+            </a:r>
           </a:p>
         </p:txBody>
       </p:sp>
@@ -26185,21 +27945,8 @@
                 <a:ea typeface="Arial" charset="0"/>
                 <a:cs typeface="Arial" charset="0"/>
               </a:rPr>
-              <a:t>Seminar/w </a:t>
-            </a:r>
-            <a:r>
-              <a:rPr lang="en-US" altLang="ja-JP" sz="1100" b="1" dirty="0" smtClean="0">
-                <a:latin typeface="Arial" charset="0"/>
-                <a:ea typeface="Arial" charset="0"/>
-                <a:cs typeface="Arial" charset="0"/>
-              </a:rPr>
-              <a:t>IBM</a:t>
-            </a:r>
-            <a:endParaRPr lang="en-US" altLang="ja-JP" sz="1100" b="1" dirty="0" smtClean="0">
-              <a:latin typeface="Arial" charset="0"/>
-              <a:ea typeface="Arial" charset="0"/>
-              <a:cs typeface="Arial" charset="0"/>
-            </a:endParaRPr>
+              <a:t>Seminar/w IBM</a:t>
+            </a:r>
           </a:p>
         </p:txBody>
       </p:sp>
@@ -26832,755 +28579,16 @@
           </a:p>
         </p:txBody>
       </p:sp>
-    </p:spTree>
-    <p:extLst>
-      <p:ext uri="{BB962C8B-B14F-4D97-AF65-F5344CB8AC3E}">
-        <p14:creationId xmlns:p14="http://schemas.microsoft.com/office/powerpoint/2010/main" val="1202493982"/>
-      </p:ext>
-    </p:extLst>
-  </p:cSld>
-  <p:clrMapOvr>
-    <a:masterClrMapping/>
-  </p:clrMapOvr>
-  <p:timing>
-    <p:tnLst>
-      <p:par>
-        <p:cTn id="1" dur="indefinite" restart="never" nodeType="tmRoot"/>
-      </p:par>
-    </p:tnLst>
-  </p:timing>
-</p:sld>
-</file>
-
-<file path=ppt/slides/slide6.xml><?xml version="1.0" encoding="utf-8"?>
-<p:sld xmlns:a="http://schemas.openxmlformats.org/drawingml/2006/main" xmlns:r="http://schemas.openxmlformats.org/officeDocument/2006/relationships" xmlns:p="http://schemas.openxmlformats.org/presentationml/2006/main">
-  <p:cSld>
-    <p:spTree>
-      <p:nvGrpSpPr>
-        <p:cNvPr id="1" name=""/>
-        <p:cNvGrpSpPr/>
-        <p:nvPr/>
-      </p:nvGrpSpPr>
-      <p:grpSpPr>
-        <a:xfrm>
-          <a:off x="0" y="0"/>
-          <a:ext cx="0" cy="0"/>
-          <a:chOff x="0" y="0"/>
-          <a:chExt cx="0" cy="0"/>
-        </a:xfrm>
-      </p:grpSpPr>
-      <p:graphicFrame>
-        <p:nvGraphicFramePr>
-          <p:cNvPr id="12" name="表 11"/>
-          <p:cNvGraphicFramePr>
-            <a:graphicFrameLocks noGrp="1"/>
-          </p:cNvGraphicFramePr>
-          <p:nvPr>
-            <p:extLst>
-              <p:ext uri="{D42A27DB-BD31-4B8C-83A1-F6EECF244321}">
-                <p14:modId xmlns:p14="http://schemas.microsoft.com/office/powerpoint/2010/main" val="1934570179"/>
-              </p:ext>
-            </p:extLst>
-          </p:nvPr>
-        </p:nvGraphicFramePr>
-        <p:xfrm>
-          <a:off x="1236977" y="1733477"/>
-          <a:ext cx="8741500" cy="3710394"/>
-        </p:xfrm>
-        <a:graphic>
-          <a:graphicData uri="http://schemas.openxmlformats.org/drawingml/2006/table">
-            <a:tbl>
-              <a:tblPr>
-                <a:tableStyleId>{D7AC3CCA-C797-4891-BE02-D94E43425B78}</a:tableStyleId>
-              </a:tblPr>
-              <a:tblGrid>
-                <a:gridCol w="6303020"/>
-                <a:gridCol w="2438480"/>
-              </a:tblGrid>
-              <a:tr h="412266">
-                <a:tc>
-                  <a:txBody>
-                    <a:bodyPr/>
-                    <a:lstStyle/>
-                    <a:p>
-                      <a:pPr algn="l" fontAlgn="b"/>
-                      <a:endParaRPr lang="en-US" sz="2000" b="0" i="0" u="none" strike="noStrike" dirty="0">
-                        <a:solidFill>
-                          <a:srgbClr val="000000"/>
-                        </a:solidFill>
-                        <a:effectLst/>
-                        <a:latin typeface="Arial" charset="0"/>
-                        <a:ea typeface="Arial" charset="0"/>
-                        <a:cs typeface="Arial" charset="0"/>
-                      </a:endParaRPr>
-                    </a:p>
-                  </a:txBody>
-                  <a:tcPr marL="6350" marR="6350" marT="6350" marB="0" anchor="b">
-                    <a:noFill/>
-                  </a:tcPr>
-                </a:tc>
-                <a:tc>
-                  <a:txBody>
-                    <a:bodyPr/>
-                    <a:lstStyle/>
-                    <a:p>
-                      <a:pPr algn="r" fontAlgn="b"/>
-                      <a:r>
-                        <a:rPr lang="is-IS" sz="2000" u="none" strike="noStrike" dirty="0" smtClean="0">
-                          <a:effectLst/>
-                          <a:latin typeface="Arial" charset="0"/>
-                          <a:ea typeface="Arial" charset="0"/>
-                          <a:cs typeface="Arial" charset="0"/>
-                        </a:rPr>
-                        <a:t>K$</a:t>
-                      </a:r>
-                      <a:endParaRPr lang="is-IS" sz="2000" b="0" i="0" u="none" strike="noStrike" dirty="0">
-                        <a:solidFill>
-                          <a:srgbClr val="000000"/>
-                        </a:solidFill>
-                        <a:effectLst/>
-                        <a:latin typeface="Arial" charset="0"/>
-                        <a:ea typeface="Arial" charset="0"/>
-                        <a:cs typeface="Arial" charset="0"/>
-                      </a:endParaRPr>
-                    </a:p>
-                  </a:txBody>
-                  <a:tcPr marL="6350" marR="6350" marT="6350" marB="0" anchor="b">
-                    <a:noFill/>
-                  </a:tcPr>
-                </a:tc>
-              </a:tr>
-              <a:tr h="412266">
-                <a:tc>
-                  <a:txBody>
-                    <a:bodyPr/>
-                    <a:lstStyle/>
-                    <a:p>
-                      <a:pPr algn="l" fontAlgn="b"/>
-                      <a:r>
-                        <a:rPr lang="en-US" sz="2000" u="none" strike="noStrike" dirty="0">
-                          <a:effectLst/>
-                          <a:latin typeface="Arial" charset="0"/>
-                          <a:ea typeface="Arial" charset="0"/>
-                          <a:cs typeface="Arial" charset="0"/>
-                        </a:rPr>
-                        <a:t>ARR </a:t>
-                      </a:r>
-                      <a:r>
-                        <a:rPr lang="en-US" sz="2000" u="none" strike="noStrike" dirty="0" err="1">
-                          <a:effectLst/>
-                          <a:latin typeface="Arial" charset="0"/>
-                          <a:ea typeface="Arial" charset="0"/>
-                          <a:cs typeface="Arial" charset="0"/>
-                        </a:rPr>
-                        <a:t>Traget</a:t>
-                      </a:r>
-                      <a:endParaRPr lang="en-US" sz="2000" b="0" i="0" u="none" strike="noStrike" dirty="0">
-                        <a:solidFill>
-                          <a:srgbClr val="000000"/>
-                        </a:solidFill>
-                        <a:effectLst/>
-                        <a:latin typeface="Arial" charset="0"/>
-                        <a:ea typeface="Arial" charset="0"/>
-                        <a:cs typeface="Arial" charset="0"/>
-                      </a:endParaRPr>
-                    </a:p>
-                  </a:txBody>
-                  <a:tcPr marL="6350" marR="6350" marT="6350" marB="0" anchor="b"/>
-                </a:tc>
-                <a:tc>
-                  <a:txBody>
-                    <a:bodyPr/>
-                    <a:lstStyle/>
-                    <a:p>
-                      <a:pPr algn="r" fontAlgn="b"/>
-                      <a:r>
-                        <a:rPr lang="is-IS" sz="2000" u="none" strike="noStrike" dirty="0" smtClean="0">
-                          <a:effectLst/>
-                          <a:latin typeface="Arial" charset="0"/>
-                          <a:ea typeface="Arial" charset="0"/>
-                          <a:cs typeface="Arial" charset="0"/>
-                        </a:rPr>
-                        <a:t>XX</a:t>
-                      </a:r>
-                      <a:endParaRPr lang="is-IS" sz="2000" b="0" i="0" u="none" strike="noStrike" dirty="0">
-                        <a:solidFill>
-                          <a:srgbClr val="000000"/>
-                        </a:solidFill>
-                        <a:effectLst/>
-                        <a:latin typeface="Arial" charset="0"/>
-                        <a:ea typeface="Arial" charset="0"/>
-                        <a:cs typeface="Arial" charset="0"/>
-                      </a:endParaRPr>
-                    </a:p>
-                  </a:txBody>
-                  <a:tcPr marL="6350" marR="6350" marT="6350" marB="0" anchor="b"/>
-                </a:tc>
-              </a:tr>
-              <a:tr h="412266">
-                <a:tc>
-                  <a:txBody>
-                    <a:bodyPr/>
-                    <a:lstStyle/>
-                    <a:p>
-                      <a:pPr algn="l" fontAlgn="b"/>
-                      <a:r>
-                        <a:rPr lang="en-US" sz="2000" u="none" strike="noStrike" dirty="0">
-                          <a:effectLst/>
-                          <a:latin typeface="Arial" charset="0"/>
-                          <a:ea typeface="Arial" charset="0"/>
-                          <a:cs typeface="Arial" charset="0"/>
-                        </a:rPr>
-                        <a:t>Average Deal Size</a:t>
-                      </a:r>
-                      <a:endParaRPr lang="en-US" sz="2000" b="0" i="0" u="none" strike="noStrike" dirty="0">
-                        <a:solidFill>
-                          <a:srgbClr val="000000"/>
-                        </a:solidFill>
-                        <a:effectLst/>
-                        <a:latin typeface="Arial" charset="0"/>
-                        <a:ea typeface="Arial" charset="0"/>
-                        <a:cs typeface="Arial" charset="0"/>
-                      </a:endParaRPr>
-                    </a:p>
-                  </a:txBody>
-                  <a:tcPr marL="6350" marR="6350" marT="6350" marB="0" anchor="b"/>
-                </a:tc>
-                <a:tc>
-                  <a:txBody>
-                    <a:bodyPr/>
-                    <a:lstStyle/>
-                    <a:p>
-                      <a:pPr algn="r" fontAlgn="b"/>
-                      <a:endParaRPr lang="is-IS" sz="2000" b="0" i="0" u="none" strike="noStrike" dirty="0">
-                        <a:solidFill>
-                          <a:srgbClr val="000000"/>
-                        </a:solidFill>
-                        <a:effectLst/>
-                        <a:latin typeface="Arial" charset="0"/>
-                        <a:ea typeface="Arial" charset="0"/>
-                        <a:cs typeface="Arial" charset="0"/>
-                      </a:endParaRPr>
-                    </a:p>
-                  </a:txBody>
-                  <a:tcPr marL="6350" marR="6350" marT="6350" marB="0" anchor="b"/>
-                </a:tc>
-              </a:tr>
-              <a:tr h="412266">
-                <a:tc>
-                  <a:txBody>
-                    <a:bodyPr/>
-                    <a:lstStyle/>
-                    <a:p>
-                      <a:pPr algn="l" fontAlgn="b"/>
-                      <a:r>
-                        <a:rPr lang="en-US" sz="2000" u="none" strike="noStrike" dirty="0">
-                          <a:effectLst/>
-                          <a:latin typeface="Arial" charset="0"/>
-                          <a:ea typeface="Arial" charset="0"/>
-                          <a:cs typeface="Arial" charset="0"/>
-                        </a:rPr>
-                        <a:t>Required Pipeline (x4)</a:t>
-                      </a:r>
-                      <a:endParaRPr lang="en-US" sz="2000" b="0" i="0" u="none" strike="noStrike" dirty="0">
-                        <a:solidFill>
-                          <a:srgbClr val="000000"/>
-                        </a:solidFill>
-                        <a:effectLst/>
-                        <a:latin typeface="Arial" charset="0"/>
-                        <a:ea typeface="Arial" charset="0"/>
-                        <a:cs typeface="Arial" charset="0"/>
-                      </a:endParaRPr>
-                    </a:p>
-                  </a:txBody>
-                  <a:tcPr marL="6350" marR="6350" marT="6350" marB="0" anchor="b"/>
-                </a:tc>
-                <a:tc>
-                  <a:txBody>
-                    <a:bodyPr/>
-                    <a:lstStyle/>
-                    <a:p>
-                      <a:pPr algn="r" fontAlgn="b"/>
-                      <a:endParaRPr lang="is-IS" sz="2000" b="0" i="0" u="none" strike="noStrike" dirty="0">
-                        <a:solidFill>
-                          <a:srgbClr val="000000"/>
-                        </a:solidFill>
-                        <a:effectLst/>
-                        <a:latin typeface="Arial" charset="0"/>
-                        <a:ea typeface="Arial" charset="0"/>
-                        <a:cs typeface="Arial" charset="0"/>
-                      </a:endParaRPr>
-                    </a:p>
-                  </a:txBody>
-                  <a:tcPr marL="6350" marR="6350" marT="6350" marB="0" anchor="b"/>
-                </a:tc>
-              </a:tr>
-              <a:tr h="412266">
-                <a:tc>
-                  <a:txBody>
-                    <a:bodyPr/>
-                    <a:lstStyle/>
-                    <a:p>
-                      <a:pPr algn="l" fontAlgn="b"/>
-                      <a:r>
-                        <a:rPr lang="en-US" sz="2000" u="none" strike="noStrike" dirty="0">
-                          <a:effectLst/>
-                          <a:latin typeface="Arial" charset="0"/>
-                          <a:ea typeface="Arial" charset="0"/>
-                          <a:cs typeface="Arial" charset="0"/>
-                        </a:rPr>
-                        <a:t>Required </a:t>
-                      </a:r>
-                      <a:r>
-                        <a:rPr lang="en-US" sz="2000" u="none" strike="noStrike" dirty="0" err="1">
-                          <a:effectLst/>
-                          <a:latin typeface="Arial" charset="0"/>
-                          <a:ea typeface="Arial" charset="0"/>
-                          <a:cs typeface="Arial" charset="0"/>
-                        </a:rPr>
-                        <a:t>Oppty</a:t>
-                      </a:r>
-                      <a:endParaRPr lang="en-US" sz="2000" b="0" i="0" u="none" strike="noStrike" dirty="0">
-                        <a:solidFill>
-                          <a:srgbClr val="000000"/>
-                        </a:solidFill>
-                        <a:effectLst/>
-                        <a:latin typeface="Arial" charset="0"/>
-                        <a:ea typeface="Arial" charset="0"/>
-                        <a:cs typeface="Arial" charset="0"/>
-                      </a:endParaRPr>
-                    </a:p>
-                  </a:txBody>
-                  <a:tcPr marL="6350" marR="6350" marT="6350" marB="0" anchor="b"/>
-                </a:tc>
-                <a:tc>
-                  <a:txBody>
-                    <a:bodyPr/>
-                    <a:lstStyle/>
-                    <a:p>
-                      <a:pPr algn="r" fontAlgn="b"/>
-                      <a:endParaRPr lang="fi-FI" sz="2000" b="0" i="0" u="none" strike="noStrike" dirty="0">
-                        <a:solidFill>
-                          <a:srgbClr val="000000"/>
-                        </a:solidFill>
-                        <a:effectLst/>
-                        <a:latin typeface="Arial" charset="0"/>
-                        <a:ea typeface="Arial" charset="0"/>
-                        <a:cs typeface="Arial" charset="0"/>
-                      </a:endParaRPr>
-                    </a:p>
-                  </a:txBody>
-                  <a:tcPr marL="6350" marR="6350" marT="6350" marB="0" anchor="b"/>
-                </a:tc>
-              </a:tr>
-              <a:tr h="412266">
-                <a:tc>
-                  <a:txBody>
-                    <a:bodyPr/>
-                    <a:lstStyle/>
-                    <a:p>
-                      <a:pPr algn="l" fontAlgn="b"/>
-                      <a:r>
-                        <a:rPr lang="en-US" sz="2000" u="none" strike="noStrike">
-                          <a:effectLst/>
-                          <a:latin typeface="Arial" charset="0"/>
-                          <a:ea typeface="Arial" charset="0"/>
-                          <a:cs typeface="Arial" charset="0"/>
-                        </a:rPr>
-                        <a:t>Beginning Pipeline Inventory</a:t>
-                      </a:r>
-                      <a:endParaRPr lang="en-US" sz="2000" b="0" i="0" u="none" strike="noStrike">
-                        <a:solidFill>
-                          <a:srgbClr val="000000"/>
-                        </a:solidFill>
-                        <a:effectLst/>
-                        <a:latin typeface="Arial" charset="0"/>
-                        <a:ea typeface="Arial" charset="0"/>
-                        <a:cs typeface="Arial" charset="0"/>
-                      </a:endParaRPr>
-                    </a:p>
-                  </a:txBody>
-                  <a:tcPr marL="6350" marR="6350" marT="6350" marB="0" anchor="b"/>
-                </a:tc>
-                <a:tc>
-                  <a:txBody>
-                    <a:bodyPr/>
-                    <a:lstStyle/>
-                    <a:p>
-                      <a:pPr algn="r" fontAlgn="b"/>
-                      <a:endParaRPr lang="en-US" sz="2000" b="0" i="0" u="none" strike="noStrike" dirty="0">
-                        <a:solidFill>
-                          <a:srgbClr val="000000"/>
-                        </a:solidFill>
-                        <a:effectLst/>
-                        <a:latin typeface="Arial" charset="0"/>
-                        <a:ea typeface="Arial" charset="0"/>
-                        <a:cs typeface="Arial" charset="0"/>
-                      </a:endParaRPr>
-                    </a:p>
-                  </a:txBody>
-                  <a:tcPr marL="6350" marR="6350" marT="6350" marB="0" anchor="b"/>
-                </a:tc>
-              </a:tr>
-              <a:tr h="412266">
-                <a:tc>
-                  <a:txBody>
-                    <a:bodyPr/>
-                    <a:lstStyle/>
-                    <a:p>
-                      <a:pPr algn="l" fontAlgn="b"/>
-                      <a:r>
-                        <a:rPr lang="en-US" sz="2000" u="none" strike="noStrike">
-                          <a:effectLst/>
-                          <a:latin typeface="Arial" charset="0"/>
-                          <a:ea typeface="Arial" charset="0"/>
-                          <a:cs typeface="Arial" charset="0"/>
-                        </a:rPr>
-                        <a:t>Pipeline Generation needed (=PPL Gap)</a:t>
-                      </a:r>
-                      <a:endParaRPr lang="en-US" sz="2000" b="0" i="0" u="none" strike="noStrike">
-                        <a:solidFill>
-                          <a:srgbClr val="000000"/>
-                        </a:solidFill>
-                        <a:effectLst/>
-                        <a:latin typeface="Arial" charset="0"/>
-                        <a:ea typeface="Arial" charset="0"/>
-                        <a:cs typeface="Arial" charset="0"/>
-                      </a:endParaRPr>
-                    </a:p>
-                  </a:txBody>
-                  <a:tcPr marL="6350" marR="6350" marT="6350" marB="0" anchor="b"/>
-                </a:tc>
-                <a:tc>
-                  <a:txBody>
-                    <a:bodyPr/>
-                    <a:lstStyle/>
-                    <a:p>
-                      <a:pPr algn="r" fontAlgn="b"/>
-                      <a:endParaRPr lang="is-IS" sz="2000" b="0" i="0" u="none" strike="noStrike" dirty="0">
-                        <a:solidFill>
-                          <a:srgbClr val="000000"/>
-                        </a:solidFill>
-                        <a:effectLst/>
-                        <a:latin typeface="Arial" charset="0"/>
-                        <a:ea typeface="Arial" charset="0"/>
-                        <a:cs typeface="Arial" charset="0"/>
-                      </a:endParaRPr>
-                    </a:p>
-                  </a:txBody>
-                  <a:tcPr marL="6350" marR="6350" marT="6350" marB="0" anchor="b"/>
-                </a:tc>
-              </a:tr>
-              <a:tr h="412266">
-                <a:tc>
-                  <a:txBody>
-                    <a:bodyPr/>
-                    <a:lstStyle/>
-                    <a:p>
-                      <a:pPr algn="l" fontAlgn="b"/>
-                      <a:r>
-                        <a:rPr lang="en-US" sz="2000" u="none" strike="noStrike">
-                          <a:effectLst/>
-                          <a:latin typeface="Arial" charset="0"/>
-                          <a:ea typeface="Arial" charset="0"/>
-                          <a:cs typeface="Arial" charset="0"/>
-                        </a:rPr>
-                        <a:t>Marketing Contribution (K$)</a:t>
-                      </a:r>
-                      <a:endParaRPr lang="en-US" sz="2000" b="0" i="0" u="none" strike="noStrike">
-                        <a:solidFill>
-                          <a:srgbClr val="000000"/>
-                        </a:solidFill>
-                        <a:effectLst/>
-                        <a:latin typeface="Arial" charset="0"/>
-                        <a:ea typeface="Arial" charset="0"/>
-                        <a:cs typeface="Arial" charset="0"/>
-                      </a:endParaRPr>
-                    </a:p>
-                  </a:txBody>
-                  <a:tcPr marL="6350" marR="6350" marT="6350" marB="0" anchor="b"/>
-                </a:tc>
-                <a:tc>
-                  <a:txBody>
-                    <a:bodyPr/>
-                    <a:lstStyle/>
-                    <a:p>
-                      <a:pPr algn="r" fontAlgn="b"/>
-                      <a:endParaRPr lang="fi-FI" sz="2000" b="0" i="0" u="none" strike="noStrike" dirty="0">
-                        <a:solidFill>
-                          <a:srgbClr val="000000"/>
-                        </a:solidFill>
-                        <a:effectLst/>
-                        <a:latin typeface="Arial" charset="0"/>
-                        <a:ea typeface="Arial" charset="0"/>
-                        <a:cs typeface="Arial" charset="0"/>
-                      </a:endParaRPr>
-                    </a:p>
-                  </a:txBody>
-                  <a:tcPr marL="6350" marR="6350" marT="6350" marB="0" anchor="b"/>
-                </a:tc>
-              </a:tr>
-              <a:tr h="412266">
-                <a:tc>
-                  <a:txBody>
-                    <a:bodyPr/>
-                    <a:lstStyle/>
-                    <a:p>
-                      <a:pPr algn="l" fontAlgn="b"/>
-                      <a:r>
-                        <a:rPr lang="en-US" sz="2000" u="none" strike="noStrike">
-                          <a:effectLst/>
-                          <a:latin typeface="Arial" charset="0"/>
-                          <a:ea typeface="Arial" charset="0"/>
-                          <a:cs typeface="Arial" charset="0"/>
-                        </a:rPr>
-                        <a:t>Marketing Contribution (# Oppty)</a:t>
-                      </a:r>
-                      <a:endParaRPr lang="en-US" sz="2000" b="0" i="0" u="none" strike="noStrike">
-                        <a:solidFill>
-                          <a:srgbClr val="000000"/>
-                        </a:solidFill>
-                        <a:effectLst/>
-                        <a:latin typeface="Arial" charset="0"/>
-                        <a:ea typeface="Arial" charset="0"/>
-                        <a:cs typeface="Arial" charset="0"/>
-                      </a:endParaRPr>
-                    </a:p>
-                  </a:txBody>
-                  <a:tcPr marL="6350" marR="6350" marT="6350" marB="0" anchor="b"/>
-                </a:tc>
-                <a:tc>
-                  <a:txBody>
-                    <a:bodyPr/>
-                    <a:lstStyle/>
-                    <a:p>
-                      <a:pPr algn="r" fontAlgn="b"/>
-                      <a:endParaRPr lang="is-IS" sz="2000" b="0" i="0" u="none" strike="noStrike" dirty="0">
-                        <a:solidFill>
-                          <a:srgbClr val="000000"/>
-                        </a:solidFill>
-                        <a:effectLst/>
-                        <a:latin typeface="Arial" charset="0"/>
-                        <a:ea typeface="Arial" charset="0"/>
-                        <a:cs typeface="Arial" charset="0"/>
-                      </a:endParaRPr>
-                    </a:p>
-                  </a:txBody>
-                  <a:tcPr marL="6350" marR="6350" marT="6350" marB="0" anchor="b"/>
-                </a:tc>
-              </a:tr>
-            </a:tbl>
-          </a:graphicData>
-        </a:graphic>
-      </p:graphicFrame>
       <p:sp>
         <p:nvSpPr>
-          <p:cNvPr id="2" name="Title 1"/>
-          <p:cNvSpPr>
-            <a:spLocks noGrp="1"/>
-          </p:cNvSpPr>
-          <p:nvPr>
-            <p:ph type="title"/>
-          </p:nvPr>
-        </p:nvSpPr>
-        <p:spPr>
-          <a:xfrm>
-            <a:off x="322023" y="328628"/>
-            <a:ext cx="11426632" cy="605294"/>
-          </a:xfrm>
-        </p:spPr>
-        <p:txBody>
-          <a:bodyPr/>
-          <a:lstStyle/>
-          <a:p>
-            <a:r>
-              <a:rPr lang="en-US" altLang="ja-JP" sz="3200" b="1" dirty="0" smtClean="0">
-                <a:solidFill>
-                  <a:srgbClr val="00B0F0"/>
-                </a:solidFill>
-                <a:latin typeface="Arial" charset="0"/>
-                <a:ea typeface="Arial" charset="0"/>
-                <a:cs typeface="Arial" charset="0"/>
-              </a:rPr>
-              <a:t>2017 Japan Revenue </a:t>
-            </a:r>
-            <a:r>
-              <a:rPr lang="en-US" altLang="ja-JP" sz="3200" b="1" dirty="0">
-                <a:solidFill>
-                  <a:srgbClr val="00B0F0"/>
-                </a:solidFill>
-                <a:latin typeface="Arial" charset="0"/>
-                <a:ea typeface="Arial" charset="0"/>
-                <a:cs typeface="Arial" charset="0"/>
-              </a:rPr>
-              <a:t>Target </a:t>
-            </a:r>
-            <a:r>
-              <a:rPr lang="en-US" altLang="ja-JP" sz="3200" b="1" dirty="0" smtClean="0">
-                <a:solidFill>
-                  <a:srgbClr val="00B0F0"/>
-                </a:solidFill>
-                <a:latin typeface="Arial" charset="0"/>
-                <a:ea typeface="Arial" charset="0"/>
-                <a:cs typeface="Arial" charset="0"/>
-              </a:rPr>
-              <a:t>&amp; Marketing </a:t>
-            </a:r>
-            <a:r>
-              <a:rPr lang="en-US" altLang="ja-JP" sz="3200" b="1" dirty="0">
-                <a:solidFill>
-                  <a:srgbClr val="00B0F0"/>
-                </a:solidFill>
-                <a:latin typeface="Arial" charset="0"/>
-                <a:ea typeface="Arial" charset="0"/>
-                <a:cs typeface="Arial" charset="0"/>
-              </a:rPr>
-              <a:t>Contribution</a:t>
-            </a:r>
-          </a:p>
-        </p:txBody>
-      </p:sp>
-      <p:sp>
-        <p:nvSpPr>
-          <p:cNvPr id="6" name="Rectangle 9"/>
+          <p:cNvPr id="31" name="角丸四角形 30"/>
           <p:cNvSpPr/>
           <p:nvPr/>
         </p:nvSpPr>
         <p:spPr>
           <a:xfrm>
-            <a:off x="11647754" y="6596555"/>
-            <a:ext cx="410749" cy="138499"/>
-          </a:xfrm>
-          <a:prstGeom prst="rect">
-            <a:avLst/>
-          </a:prstGeom>
-        </p:spPr>
-        <p:txBody>
-          <a:bodyPr wrap="square" lIns="0" tIns="0" rIns="0" bIns="0">
-            <a:spAutoFit/>
-          </a:bodyPr>
-          <a:lstStyle/>
-          <a:p>
-            <a:fld id="{655362CE-4ABE-4CB4-8947-B1242CDD9D94}" type="slidenum">
-              <a:rPr kumimoji="0" lang="en-US" sz="900" smtClean="0">
-                <a:solidFill>
-                  <a:srgbClr val="5A5A5A"/>
-                </a:solidFill>
-                <a:latin typeface="Arial" charset="0"/>
-                <a:ea typeface="Arial" charset="0"/>
-                <a:cs typeface="Arial" charset="0"/>
-              </a:rPr>
-              <a:pPr/>
-              <a:t>6</a:t>
-            </a:fld>
-            <a:endParaRPr kumimoji="0" lang="en-US" sz="900" dirty="0">
-              <a:solidFill>
-                <a:srgbClr val="5A5A5A"/>
-              </a:solidFill>
-              <a:latin typeface="Arial" charset="0"/>
-              <a:ea typeface="Arial" charset="0"/>
-              <a:cs typeface="Arial" charset="0"/>
-            </a:endParaRPr>
-          </a:p>
-        </p:txBody>
-      </p:sp>
-      <p:sp>
-        <p:nvSpPr>
-          <p:cNvPr id="7" name="Rectangle 14"/>
-          <p:cNvSpPr/>
-          <p:nvPr/>
-        </p:nvSpPr>
-        <p:spPr>
-          <a:xfrm>
-            <a:off x="11291779" y="6596555"/>
-            <a:ext cx="380848" cy="138499"/>
-          </a:xfrm>
-          <a:prstGeom prst="rect">
-            <a:avLst/>
-          </a:prstGeom>
-        </p:spPr>
-        <p:txBody>
-          <a:bodyPr wrap="square" lIns="0" tIns="0" rIns="0" bIns="0">
-            <a:spAutoFit/>
-          </a:bodyPr>
-          <a:lstStyle/>
-          <a:p>
-            <a:r>
-              <a:rPr kumimoji="0" lang="en-US" sz="900" dirty="0" smtClean="0">
-                <a:solidFill>
-                  <a:srgbClr val="5A5A5A"/>
-                </a:solidFill>
-                <a:latin typeface="Arial" charset="0"/>
-                <a:ea typeface="Arial" charset="0"/>
-                <a:cs typeface="Arial" charset="0"/>
-              </a:rPr>
-              <a:t>Page</a:t>
-            </a:r>
-            <a:endParaRPr kumimoji="0" lang="en-US" sz="900" dirty="0">
-              <a:solidFill>
-                <a:srgbClr val="5A5A5A"/>
-              </a:solidFill>
-              <a:latin typeface="Arial" charset="0"/>
-              <a:ea typeface="Arial" charset="0"/>
-              <a:cs typeface="Arial" charset="0"/>
-            </a:endParaRPr>
-          </a:p>
-        </p:txBody>
-      </p:sp>
-      <p:sp>
-        <p:nvSpPr>
-          <p:cNvPr id="8" name="Rectangle 9"/>
-          <p:cNvSpPr/>
-          <p:nvPr/>
-        </p:nvSpPr>
-        <p:spPr>
-          <a:xfrm>
-            <a:off x="11800154" y="6748955"/>
-            <a:ext cx="410749" cy="138499"/>
-          </a:xfrm>
-          <a:prstGeom prst="rect">
-            <a:avLst/>
-          </a:prstGeom>
-        </p:spPr>
-        <p:txBody>
-          <a:bodyPr wrap="square" lIns="0" tIns="0" rIns="0" bIns="0">
-            <a:spAutoFit/>
-          </a:bodyPr>
-          <a:lstStyle/>
-          <a:p>
-            <a:fld id="{655362CE-4ABE-4CB4-8947-B1242CDD9D94}" type="slidenum">
-              <a:rPr kumimoji="0" lang="en-US" sz="900" smtClean="0">
-                <a:solidFill>
-                  <a:srgbClr val="5A5A5A"/>
-                </a:solidFill>
-                <a:latin typeface="Arial" charset="0"/>
-                <a:ea typeface="Arial" charset="0"/>
-                <a:cs typeface="Arial" charset="0"/>
-              </a:rPr>
-              <a:pPr/>
-              <a:t>6</a:t>
-            </a:fld>
-            <a:endParaRPr kumimoji="0" lang="en-US" sz="900" dirty="0">
-              <a:solidFill>
-                <a:srgbClr val="5A5A5A"/>
-              </a:solidFill>
-              <a:latin typeface="Arial" charset="0"/>
-              <a:ea typeface="Arial" charset="0"/>
-              <a:cs typeface="Arial" charset="0"/>
-            </a:endParaRPr>
-          </a:p>
-        </p:txBody>
-      </p:sp>
-      <p:sp>
-        <p:nvSpPr>
-          <p:cNvPr id="10" name="角丸四角形 9"/>
-          <p:cNvSpPr/>
-          <p:nvPr/>
-        </p:nvSpPr>
-        <p:spPr>
-          <a:xfrm rot="20584952">
-            <a:off x="4524411" y="3801293"/>
-            <a:ext cx="3511296" cy="716526"/>
+            <a:off x="10302948" y="19943"/>
+            <a:ext cx="1889051" cy="716526"/>
           </a:xfrm>
           <a:prstGeom prst="roundRect">
             <a:avLst/>
@@ -27632,7 +28640,7 @@
     </p:spTree>
     <p:extLst>
       <p:ext uri="{BB962C8B-B14F-4D97-AF65-F5344CB8AC3E}">
-        <p14:creationId xmlns:p14="http://schemas.microsoft.com/office/powerpoint/2010/main" val="841811139"/>
+        <p14:creationId xmlns:p14="http://schemas.microsoft.com/office/powerpoint/2010/main" val="1202493982"/>
       </p:ext>
     </p:extLst>
   </p:cSld>
@@ -27649,7 +28657,7 @@
 </p:sld>
 </file>
 
-<file path=ppt/slides/slide7.xml><?xml version="1.0" encoding="utf-8"?>
+<file path=ppt/slides/slide6.xml><?xml version="1.0" encoding="utf-8"?>
 <p:sld xmlns:a="http://schemas.openxmlformats.org/drawingml/2006/main" xmlns:r="http://schemas.openxmlformats.org/officeDocument/2006/relationships" xmlns:p="http://schemas.openxmlformats.org/presentationml/2006/main">
   <p:cSld>
     <p:spTree>
@@ -30320,7 +31328,7 @@
 </p:sld>
 </file>
 
-<file path=ppt/slides/slide8.xml><?xml version="1.0" encoding="utf-8"?>
+<file path=ppt/slides/slide7.xml><?xml version="1.0" encoding="utf-8"?>
 <p:sld xmlns:a="http://schemas.openxmlformats.org/drawingml/2006/main" xmlns:r="http://schemas.openxmlformats.org/officeDocument/2006/relationships" xmlns:p="http://schemas.openxmlformats.org/presentationml/2006/main">
   <p:cSld>
     <p:spTree>
@@ -30723,7 +31731,7 @@
 </p:sld>
 </file>
 
-<file path=ppt/slides/slide9.xml><?xml version="1.0" encoding="utf-8"?>
+<file path=ppt/slides/slide8.xml><?xml version="1.0" encoding="utf-8"?>
 <p:sld xmlns:a="http://schemas.openxmlformats.org/drawingml/2006/main" xmlns:r="http://schemas.openxmlformats.org/officeDocument/2006/relationships" xmlns:p="http://schemas.openxmlformats.org/presentationml/2006/main">
   <p:cSld>
     <p:spTree>
@@ -30810,6 +31818,448 @@
     <p:extLst>
       <p:ext uri="{BB962C8B-B14F-4D97-AF65-F5344CB8AC3E}">
         <p14:creationId xmlns:p14="http://schemas.microsoft.com/office/powerpoint/2010/main" val="1572702477"/>
+      </p:ext>
+    </p:extLst>
+  </p:cSld>
+  <p:clrMapOvr>
+    <a:masterClrMapping/>
+  </p:clrMapOvr>
+  <p:timing>
+    <p:tnLst>
+      <p:par>
+        <p:cTn id="1" dur="indefinite" restart="never" nodeType="tmRoot"/>
+      </p:par>
+    </p:tnLst>
+  </p:timing>
+</p:sld>
+</file>
+
+<file path=ppt/slides/slide9.xml><?xml version="1.0" encoding="utf-8"?>
+<p:sld xmlns:a="http://schemas.openxmlformats.org/drawingml/2006/main" xmlns:r="http://schemas.openxmlformats.org/officeDocument/2006/relationships" xmlns:p="http://schemas.openxmlformats.org/presentationml/2006/main">
+  <p:cSld>
+    <p:spTree>
+      <p:nvGrpSpPr>
+        <p:cNvPr id="1" name=""/>
+        <p:cNvGrpSpPr/>
+        <p:nvPr/>
+      </p:nvGrpSpPr>
+      <p:grpSpPr>
+        <a:xfrm>
+          <a:off x="0" y="0"/>
+          <a:ext cx="0" cy="0"/>
+          <a:chOff x="0" y="0"/>
+          <a:chExt cx="0" cy="0"/>
+        </a:xfrm>
+      </p:grpSpPr>
+      <p:sp>
+        <p:nvSpPr>
+          <p:cNvPr id="2" name="Title 1"/>
+          <p:cNvSpPr>
+            <a:spLocks noGrp="1"/>
+          </p:cNvSpPr>
+          <p:nvPr>
+            <p:ph type="title"/>
+          </p:nvPr>
+        </p:nvSpPr>
+        <p:spPr>
+          <a:xfrm>
+            <a:off x="322023" y="328628"/>
+            <a:ext cx="11426632" cy="605294"/>
+          </a:xfrm>
+        </p:spPr>
+        <p:txBody>
+          <a:bodyPr/>
+          <a:lstStyle/>
+          <a:p>
+            <a:r>
+              <a:rPr kumimoji="1" lang="en-US" altLang="ja-JP" sz="3600" b="1" dirty="0" smtClean="0">
+                <a:solidFill>
+                  <a:srgbClr val="00B0F0"/>
+                </a:solidFill>
+                <a:latin typeface="Arial" charset="0"/>
+                <a:ea typeface="Arial" charset="0"/>
+                <a:cs typeface="Arial" charset="0"/>
+              </a:rPr>
+              <a:t>Persona</a:t>
+            </a:r>
+            <a:endParaRPr kumimoji="1" lang="ja-JP" altLang="en-US" sz="2933" b="1" dirty="0">
+              <a:solidFill>
+                <a:srgbClr val="00B0F0"/>
+              </a:solidFill>
+              <a:latin typeface="Arial" charset="0"/>
+              <a:ea typeface="Arial" charset="0"/>
+              <a:cs typeface="Arial" charset="0"/>
+            </a:endParaRPr>
+          </a:p>
+        </p:txBody>
+      </p:sp>
+      <p:sp>
+        <p:nvSpPr>
+          <p:cNvPr id="5" name="Text Placeholder 3"/>
+          <p:cNvSpPr>
+            <a:spLocks noGrp="1"/>
+          </p:cNvSpPr>
+          <p:nvPr>
+            <p:ph type="body" sz="quarter" idx="11"/>
+          </p:nvPr>
+        </p:nvSpPr>
+        <p:spPr>
+          <a:xfrm>
+            <a:off x="322023" y="2952711"/>
+            <a:ext cx="5859321" cy="3200876"/>
+          </a:xfrm>
+        </p:spPr>
+        <p:txBody>
+          <a:bodyPr/>
+          <a:lstStyle/>
+          <a:p>
+            <a:pPr marL="0" indent="0">
+              <a:buNone/>
+            </a:pPr>
+            <a:r>
+              <a:rPr lang="en-US" altLang="ja-JP" sz="2000" b="1" dirty="0">
+                <a:solidFill>
+                  <a:schemeClr val="tx1"/>
+                </a:solidFill>
+                <a:latin typeface="Arial" charset="0"/>
+                <a:ea typeface="Arial" charset="0"/>
+                <a:cs typeface="Arial" charset="0"/>
+              </a:rPr>
+              <a:t>in-house Developers in </a:t>
+            </a:r>
+            <a:r>
+              <a:rPr lang="en-US" altLang="ja-JP" sz="2000" b="1" dirty="0" smtClean="0">
+                <a:solidFill>
+                  <a:schemeClr val="tx1"/>
+                </a:solidFill>
+                <a:latin typeface="Arial" charset="0"/>
+                <a:ea typeface="Arial" charset="0"/>
+                <a:cs typeface="Arial" charset="0"/>
+              </a:rPr>
+              <a:t>larger companies:</a:t>
+            </a:r>
+          </a:p>
+          <a:p>
+            <a:pPr marL="0" indent="0">
+              <a:buNone/>
+            </a:pPr>
+            <a:r>
+              <a:rPr lang="en-US" altLang="ja-JP" dirty="0" smtClean="0">
+                <a:solidFill>
+                  <a:schemeClr val="tx1"/>
+                </a:solidFill>
+                <a:latin typeface="Arial" charset="0"/>
+                <a:ea typeface="Arial" charset="0"/>
+                <a:cs typeface="Arial" charset="0"/>
+              </a:rPr>
+              <a:t>Who is </a:t>
+            </a:r>
+            <a:r>
+              <a:rPr lang="en-US" altLang="ja-JP" dirty="0">
+                <a:solidFill>
+                  <a:schemeClr val="tx1"/>
+                </a:solidFill>
+                <a:latin typeface="Arial" charset="0"/>
+                <a:ea typeface="Arial" charset="0"/>
+                <a:cs typeface="Arial" charset="0"/>
+              </a:rPr>
+              <a:t>involved in the innovation, design, coding, testing and maintenance for both front-end and back-end development depending on the needs and resources of a project</a:t>
+            </a:r>
+            <a:r>
+              <a:rPr lang="en-US" altLang="ja-JP" dirty="0" smtClean="0">
+                <a:solidFill>
+                  <a:schemeClr val="tx1"/>
+                </a:solidFill>
+                <a:latin typeface="Arial" charset="0"/>
+                <a:ea typeface="Arial" charset="0"/>
+                <a:cs typeface="Arial" charset="0"/>
+              </a:rPr>
+              <a:t>.</a:t>
+            </a:r>
+          </a:p>
+          <a:p>
+            <a:pPr marL="0" indent="0">
+              <a:buNone/>
+            </a:pPr>
+            <a:r>
+              <a:rPr lang="en-US" altLang="ja-JP" dirty="0" smtClean="0">
+                <a:solidFill>
+                  <a:schemeClr val="tx1"/>
+                </a:solidFill>
+                <a:latin typeface="Arial" charset="0"/>
+                <a:ea typeface="Arial" charset="0"/>
+                <a:cs typeface="Arial" charset="0"/>
+              </a:rPr>
+              <a:t>He </a:t>
+            </a:r>
+            <a:r>
+              <a:rPr lang="en-US" altLang="ja-JP" dirty="0">
+                <a:solidFill>
+                  <a:schemeClr val="tx1"/>
+                </a:solidFill>
+                <a:latin typeface="Arial" charset="0"/>
+                <a:ea typeface="Arial" charset="0"/>
+                <a:cs typeface="Arial" charset="0"/>
+              </a:rPr>
+              <a:t>mainly codes in C# or Java for customer-facing applications. He also uses HTML/CSS, JavaScript, and some PHP for smaller web or mobile projects. Nick also integrates with back-end web-services, APIs, legacy applications, databases and packaged </a:t>
+            </a:r>
+            <a:r>
+              <a:rPr lang="en-US" altLang="ja-JP" dirty="0" smtClean="0">
+                <a:solidFill>
+                  <a:schemeClr val="tx1"/>
+                </a:solidFill>
+                <a:latin typeface="Arial" charset="0"/>
+                <a:ea typeface="Arial" charset="0"/>
+                <a:cs typeface="Arial" charset="0"/>
+              </a:rPr>
+              <a:t>applications.</a:t>
+            </a:r>
+          </a:p>
+          <a:p>
+            <a:pPr marL="0" indent="0">
+              <a:buNone/>
+            </a:pPr>
+            <a:r>
+              <a:rPr lang="en-US" altLang="ja-JP" dirty="0" smtClean="0">
+                <a:solidFill>
+                  <a:schemeClr val="tx1"/>
+                </a:solidFill>
+                <a:latin typeface="Arial" charset="0"/>
+                <a:ea typeface="Arial" charset="0"/>
+                <a:cs typeface="Arial" charset="0"/>
+              </a:rPr>
+              <a:t>He </a:t>
+            </a:r>
+            <a:r>
+              <a:rPr lang="en-US" altLang="ja-JP" dirty="0">
+                <a:solidFill>
+                  <a:schemeClr val="tx1"/>
+                </a:solidFill>
+                <a:latin typeface="Arial" charset="0"/>
+                <a:ea typeface="Arial" charset="0"/>
+                <a:cs typeface="Arial" charset="0"/>
+              </a:rPr>
+              <a:t>wants to get work done quickly and with minimal interruptions. He wants tools that allow more effective collaboration and communication</a:t>
+            </a:r>
+            <a:r>
+              <a:rPr lang="en-US" altLang="ja-JP" dirty="0" smtClean="0">
+                <a:solidFill>
+                  <a:schemeClr val="tx1"/>
+                </a:solidFill>
+                <a:latin typeface="Arial" charset="0"/>
+                <a:ea typeface="Arial" charset="0"/>
+                <a:cs typeface="Arial" charset="0"/>
+              </a:rPr>
+              <a:t>.</a:t>
+            </a:r>
+          </a:p>
+        </p:txBody>
+      </p:sp>
+      <p:sp>
+        <p:nvSpPr>
+          <p:cNvPr id="18" name="Text Placeholder 3"/>
+          <p:cNvSpPr>
+            <a:spLocks noGrp="1"/>
+          </p:cNvSpPr>
+          <p:nvPr>
+            <p:ph type="body" sz="quarter" idx="12"/>
+          </p:nvPr>
+        </p:nvSpPr>
+        <p:spPr>
+          <a:xfrm>
+            <a:off x="6940362" y="2952711"/>
+            <a:ext cx="5093141" cy="3816429"/>
+          </a:xfrm>
+        </p:spPr>
+        <p:txBody>
+          <a:bodyPr/>
+          <a:lstStyle/>
+          <a:p>
+            <a:pPr marL="0" indent="0">
+              <a:lnSpc>
+                <a:spcPct val="100000"/>
+              </a:lnSpc>
+              <a:buNone/>
+            </a:pPr>
+            <a:r>
+              <a:rPr lang="en-US" altLang="ja-JP" sz="1800" b="1" dirty="0">
+                <a:solidFill>
+                  <a:schemeClr val="tx1"/>
+                </a:solidFill>
+                <a:latin typeface="Arial" charset="0"/>
+                <a:ea typeface="Arial" charset="0"/>
+                <a:cs typeface="Arial" charset="0"/>
+              </a:rPr>
+              <a:t>Client Challenges </a:t>
+            </a:r>
+            <a:endParaRPr lang="en-US" altLang="ja-JP" sz="1800" dirty="0">
+              <a:solidFill>
+                <a:schemeClr val="tx1"/>
+              </a:solidFill>
+              <a:latin typeface="Arial" charset="0"/>
+              <a:ea typeface="Arial" charset="0"/>
+              <a:cs typeface="Arial" charset="0"/>
+            </a:endParaRPr>
+          </a:p>
+          <a:p>
+            <a:pPr marL="285750" indent="-285750">
+              <a:lnSpc>
+                <a:spcPct val="100000"/>
+              </a:lnSpc>
+              <a:buFont typeface="Wingdings" charset="2"/>
+              <a:buChar char="p"/>
+            </a:pPr>
+            <a:r>
+              <a:rPr lang="en-US" altLang="ja-JP" sz="1600" dirty="0">
+                <a:solidFill>
+                  <a:schemeClr val="tx1"/>
+                </a:solidFill>
+                <a:latin typeface="Arial" charset="0"/>
+                <a:ea typeface="Arial" charset="0"/>
+                <a:cs typeface="Arial" charset="0"/>
+              </a:rPr>
+              <a:t>Deal with delays and bottlenecks across the software delivery lifecycle, </a:t>
+            </a:r>
+            <a:r>
+              <a:rPr lang="en-US" altLang="ja-JP" sz="1600" dirty="0" smtClean="0">
+                <a:solidFill>
+                  <a:schemeClr val="tx1"/>
+                </a:solidFill>
+                <a:latin typeface="Arial" charset="0"/>
+                <a:ea typeface="Arial" charset="0"/>
+                <a:cs typeface="Arial" charset="0"/>
+              </a:rPr>
+              <a:t>achieve </a:t>
+            </a:r>
+            <a:r>
+              <a:rPr lang="en-US" altLang="ja-JP" sz="1600" dirty="0">
+                <a:solidFill>
+                  <a:schemeClr val="tx1"/>
+                </a:solidFill>
+                <a:latin typeface="Arial" charset="0"/>
+                <a:ea typeface="Arial" charset="0"/>
+                <a:cs typeface="Arial" charset="0"/>
+              </a:rPr>
+              <a:t>faster response times for defect analysis and </a:t>
+            </a:r>
+            <a:r>
+              <a:rPr lang="en-US" altLang="ja-JP" sz="1600" dirty="0" smtClean="0">
+                <a:solidFill>
+                  <a:schemeClr val="tx1"/>
+                </a:solidFill>
+                <a:latin typeface="Arial" charset="0"/>
+                <a:ea typeface="Arial" charset="0"/>
+                <a:cs typeface="Arial" charset="0"/>
+              </a:rPr>
+              <a:t>remediation.</a:t>
+            </a:r>
+            <a:endParaRPr lang="en-US" altLang="ja-JP" sz="1600" dirty="0">
+              <a:solidFill>
+                <a:schemeClr val="tx1"/>
+              </a:solidFill>
+              <a:latin typeface="Arial" charset="0"/>
+              <a:ea typeface="Arial" charset="0"/>
+              <a:cs typeface="Arial" charset="0"/>
+            </a:endParaRPr>
+          </a:p>
+          <a:p>
+            <a:pPr marL="285750" indent="-285750">
+              <a:lnSpc>
+                <a:spcPct val="100000"/>
+              </a:lnSpc>
+              <a:buFont typeface="Wingdings" charset="2"/>
+              <a:buChar char="p"/>
+            </a:pPr>
+            <a:r>
+              <a:rPr lang="en-US" altLang="ja-JP" sz="1600" dirty="0">
+                <a:solidFill>
+                  <a:schemeClr val="tx1"/>
+                </a:solidFill>
+                <a:latin typeface="Arial" charset="0"/>
+                <a:ea typeface="Arial" charset="0"/>
+                <a:cs typeface="Arial" charset="0"/>
+              </a:rPr>
+              <a:t>Communicate effectively with clients and co-workers; working remotely with colleagues.</a:t>
+            </a:r>
+          </a:p>
+          <a:p>
+            <a:pPr marL="285750" indent="-285750">
+              <a:lnSpc>
+                <a:spcPct val="100000"/>
+              </a:lnSpc>
+              <a:buFont typeface="Wingdings" charset="2"/>
+              <a:buChar char="p"/>
+            </a:pPr>
+            <a:r>
+              <a:rPr lang="en-US" altLang="ja-JP" sz="1600" dirty="0">
+                <a:solidFill>
+                  <a:schemeClr val="tx1"/>
+                </a:solidFill>
+                <a:latin typeface="Arial" charset="0"/>
+                <a:ea typeface="Arial" charset="0"/>
+                <a:cs typeface="Arial" charset="0"/>
+              </a:rPr>
+              <a:t>Work with multiple tools across multiple projects.</a:t>
+            </a:r>
+            <a:endParaRPr lang="en-US" altLang="ja-JP" sz="1600" dirty="0" smtClean="0">
+              <a:solidFill>
+                <a:schemeClr val="tx1"/>
+              </a:solidFill>
+              <a:latin typeface="Arial" charset="0"/>
+              <a:ea typeface="Arial" charset="0"/>
+              <a:cs typeface="Arial" charset="0"/>
+            </a:endParaRPr>
+          </a:p>
+          <a:p>
+            <a:pPr marL="285750" indent="-285750">
+              <a:lnSpc>
+                <a:spcPct val="100000"/>
+              </a:lnSpc>
+              <a:buFont typeface="Wingdings" charset="2"/>
+              <a:buChar char="p"/>
+            </a:pPr>
+            <a:r>
+              <a:rPr lang="en-US" altLang="ja-JP" sz="1600" dirty="0">
+                <a:solidFill>
+                  <a:schemeClr val="tx1"/>
+                </a:solidFill>
+                <a:latin typeface="Arial" charset="0"/>
+                <a:ea typeface="Arial" charset="0"/>
+                <a:cs typeface="Arial" charset="0"/>
+              </a:rPr>
+              <a:t>Keep things in-sync across multiple projects.</a:t>
+            </a:r>
+          </a:p>
+        </p:txBody>
+      </p:sp>
+      <p:pic>
+        <p:nvPicPr>
+          <p:cNvPr id="3" name="図 2"/>
+          <p:cNvPicPr>
+            <a:picLocks noChangeAspect="1"/>
+          </p:cNvPicPr>
+          <p:nvPr/>
+        </p:nvPicPr>
+        <p:blipFill>
+          <a:blip r:embed="rId2"/>
+          <a:stretch>
+            <a:fillRect/>
+          </a:stretch>
+        </p:blipFill>
+        <p:spPr>
+          <a:xfrm>
+            <a:off x="322023" y="1152977"/>
+            <a:ext cx="1896813" cy="1580678"/>
+          </a:xfrm>
+          <a:prstGeom prst="rect">
+            <a:avLst/>
+          </a:prstGeom>
+        </p:spPr>
+      </p:pic>
+    </p:spTree>
+    <p:extLst>
+      <p:ext uri="{BB962C8B-B14F-4D97-AF65-F5344CB8AC3E}">
+        <p14:creationId xmlns:p14="http://schemas.microsoft.com/office/powerpoint/2010/main" val="1854431012"/>
       </p:ext>
     </p:extLst>
   </p:cSld>

</xml_diff>